<commit_message>
All graphs updated + Report updated
</commit_message>
<xml_diff>
--- a/Opentrons_experiments/BOTorch_optimization/Shivam_Report/Graphs_updated_final.pptx
+++ b/Opentrons_experiments/BOTorch_optimization/Shivam_Report/Graphs_updated_final.pptx
@@ -4036,44 +4036,9 @@
           <a:chExt cx="0" cy="0"/>
         </a:xfrm>
       </p:grpSpPr>
-      <p:pic>
-        <p:nvPicPr>
-          <p:cNvPr id="3" name="Picture 2">
-            <a:extLst>
-              <a:ext uri="{FF2B5EF4-FFF2-40B4-BE49-F238E27FC236}">
-                <a16:creationId xmlns:a16="http://schemas.microsoft.com/office/drawing/2014/main" id="{4D455D8F-3CE0-A86E-2D51-897DBDDF3079}"/>
-              </a:ext>
-            </a:extLst>
-          </p:cNvPr>
-          <p:cNvPicPr>
-            <a:picLocks noChangeAspect="1"/>
-          </p:cNvPicPr>
-          <p:nvPr/>
-        </p:nvPicPr>
-        <p:blipFill>
-          <a:blip r:embed="rId2">
-            <a:extLst>
-              <a:ext uri="{28A0092B-C50C-407E-A947-70E740481C1C}">
-                <a14:useLocalDpi xmlns:a14="http://schemas.microsoft.com/office/drawing/2010/main" val="0"/>
-              </a:ext>
-            </a:extLst>
-          </a:blip>
-          <a:srcRect/>
-          <a:stretch/>
-        </p:blipFill>
-        <p:spPr>
-          <a:xfrm>
-            <a:off x="266701" y="320039"/>
-            <a:ext cx="11658598" cy="6217919"/>
-          </a:xfrm>
-          <a:prstGeom prst="rect">
-            <a:avLst/>
-          </a:prstGeom>
-        </p:spPr>
-      </p:pic>
       <mc:AlternateContent xmlns:mc="http://schemas.openxmlformats.org/markup-compatibility/2006" xmlns:p14="http://schemas.microsoft.com/office/powerpoint/2010/main">
         <mc:Choice Requires="p14">
-          <p:contentPart p14:bwMode="auto" r:id="rId3">
+          <p:contentPart p14:bwMode="auto" r:id="rId2">
             <p14:nvContentPartPr>
               <p14:cNvPr id="46" name="Ink 45">
                 <a:extLst>
@@ -4929,6 +4894,42 @@
           </p:pic>
         </mc:Fallback>
       </mc:AlternateContent>
+      <p:pic>
+        <p:nvPicPr>
+          <p:cNvPr id="4" name="Picture 3" descr="A picture containing text, line, diagram, plot&#10;&#10;Description automatically generated">
+            <a:extLst>
+              <a:ext uri="{FF2B5EF4-FFF2-40B4-BE49-F238E27FC236}">
+                <a16:creationId xmlns:a16="http://schemas.microsoft.com/office/drawing/2014/main" id="{1639A127-282D-888A-DC12-83644494B915}"/>
+              </a:ext>
+            </a:extLst>
+          </p:cNvPr>
+          <p:cNvPicPr>
+            <a:picLocks noChangeAspect="1"/>
+          </p:cNvPicPr>
+          <p:nvPr/>
+        </p:nvPicPr>
+        <p:blipFill>
+          <a:blip r:embed="rId29">
+            <a:extLst>
+              <a:ext uri="{28A0092B-C50C-407E-A947-70E740481C1C}">
+                <a14:useLocalDpi xmlns:a14="http://schemas.microsoft.com/office/drawing/2010/main" val="0"/>
+              </a:ext>
+            </a:extLst>
+          </a:blip>
+          <a:stretch>
+            <a:fillRect/>
+          </a:stretch>
+        </p:blipFill>
+        <p:spPr>
+          <a:xfrm>
+            <a:off x="0" y="1803400"/>
+            <a:ext cx="12192000" cy="3251200"/>
+          </a:xfrm>
+          <a:prstGeom prst="rect">
+            <a:avLst/>
+          </a:prstGeom>
+        </p:spPr>
+      </p:pic>
     </p:spTree>
     <p:extLst>
       <p:ext uri="{BB962C8B-B14F-4D97-AF65-F5344CB8AC3E}">
@@ -4974,14 +4975,14 @@
           <p:nvPr>
             <p:extLst>
               <p:ext uri="{D42A27DB-BD31-4B8C-83A1-F6EECF244321}">
-                <p14:modId xmlns:p14="http://schemas.microsoft.com/office/powerpoint/2010/main" val="1659865467"/>
+                <p14:modId xmlns:p14="http://schemas.microsoft.com/office/powerpoint/2010/main" val="859121904"/>
               </p:ext>
             </p:extLst>
           </p:nvPr>
         </p:nvGraphicFramePr>
         <p:xfrm>
           <a:off x="0" y="1431063"/>
-          <a:ext cx="12192004" cy="4531360"/>
+          <a:ext cx="12192004" cy="4160520"/>
         </p:xfrm>
         <a:graphic>
           <a:graphicData uri="http://schemas.openxmlformats.org/drawingml/2006/table">
@@ -6645,7 +6646,7 @@
                   </a:txBody>
                   <a:tcPr>
                     <a:solidFill>
-                      <a:srgbClr val="FFFF00"/>
+                      <a:srgbClr val="CFD5EA"/>
                     </a:solidFill>
                   </a:tcPr>
                 </a:tc>
@@ -6663,43 +6664,43 @@
                   </a:txBody>
                   <a:tcPr>
                     <a:solidFill>
-                      <a:srgbClr val="FFFF00"/>
-                    </a:solidFill>
-                  </a:tcPr>
-                </a:tc>
-                <a:tc>
-                  <a:txBody>
-                    <a:bodyPr/>
-                    <a:lstStyle/>
-                    <a:p>
-                      <a:pPr algn="l"/>
-                      <a:r>
-                        <a:rPr lang="en-SG" sz="1600" dirty="0"/>
-                        <a:t>39.299209</a:t>
-                      </a:r>
-                    </a:p>
-                  </a:txBody>
-                  <a:tcPr>
-                    <a:solidFill>
-                      <a:srgbClr val="FFFF00"/>
-                    </a:solidFill>
-                  </a:tcPr>
-                </a:tc>
-                <a:tc>
-                  <a:txBody>
-                    <a:bodyPr/>
-                    <a:lstStyle/>
-                    <a:p>
-                      <a:pPr algn="l"/>
-                      <a:r>
-                        <a:rPr lang="en-SG" sz="1600" dirty="0"/>
-                        <a:t>33.334143</a:t>
-                      </a:r>
-                    </a:p>
-                  </a:txBody>
-                  <a:tcPr>
-                    <a:solidFill>
-                      <a:srgbClr val="FFFF00"/>
+                      <a:srgbClr val="CFD5EA"/>
+                    </a:solidFill>
+                  </a:tcPr>
+                </a:tc>
+                <a:tc>
+                  <a:txBody>
+                    <a:bodyPr/>
+                    <a:lstStyle/>
+                    <a:p>
+                      <a:pPr algn="l"/>
+                      <a:r>
+                        <a:rPr lang="en-SG" sz="1600" dirty="0"/>
+                        <a:t>40.938049	</a:t>
+                      </a:r>
+                    </a:p>
+                  </a:txBody>
+                  <a:tcPr>
+                    <a:solidFill>
+                      <a:srgbClr val="CFD5EA"/>
+                    </a:solidFill>
+                  </a:tcPr>
+                </a:tc>
+                <a:tc>
+                  <a:txBody>
+                    <a:bodyPr/>
+                    <a:lstStyle/>
+                    <a:p>
+                      <a:pPr algn="l"/>
+                      <a:r>
+                        <a:rPr lang="en-SG" sz="1600" dirty="0"/>
+                        <a:t>23.891547</a:t>
+                      </a:r>
+                    </a:p>
+                  </a:txBody>
+                  <a:tcPr>
+                    <a:solidFill>
+                      <a:srgbClr val="CFD5EA"/>
                     </a:solidFill>
                   </a:tcPr>
                 </a:tc>
@@ -6717,7 +6718,7 @@
                   </a:txBody>
                   <a:tcPr>
                     <a:solidFill>
-                      <a:srgbClr val="FFFF00"/>
+                      <a:srgbClr val="CFD5EA"/>
                     </a:solidFill>
                   </a:tcPr>
                 </a:tc>
@@ -6735,7 +6736,7 @@
                   </a:txBody>
                   <a:tcPr>
                     <a:solidFill>
-                      <a:srgbClr val="FFFF00"/>
+                      <a:srgbClr val="CFD5EA"/>
                     </a:solidFill>
                   </a:tcPr>
                 </a:tc>
@@ -6753,7 +6754,7 @@
                   </a:txBody>
                   <a:tcPr>
                     <a:solidFill>
-                      <a:srgbClr val="FFFF00"/>
+                      <a:srgbClr val="CFD5EA"/>
                     </a:solidFill>
                   </a:tcPr>
                 </a:tc>
@@ -6773,236 +6774,25 @@
                   </a:txBody>
                   <a:tcPr anchor="ctr">
                     <a:solidFill>
-                      <a:srgbClr val="FFFF00"/>
-                    </a:solidFill>
-                  </a:tcPr>
-                </a:tc>
-                <a:tc>
-                  <a:txBody>
-                    <a:bodyPr/>
-                    <a:lstStyle/>
-                    <a:p>
-                      <a:pPr algn="l"/>
-                      <a:r>
-                        <a:rPr lang="en-SG" sz="1600" dirty="0"/>
-                        <a:t>-2.066677	</a:t>
-                      </a:r>
-                    </a:p>
-                  </a:txBody>
-                  <a:tcPr>
-                    <a:solidFill>
-                      <a:srgbClr val="FFFF00"/>
-                    </a:solidFill>
-                  </a:tcPr>
-                </a:tc>
-                <a:tc>
-                  <a:txBody>
-                    <a:bodyPr/>
-                    <a:lstStyle/>
-                    <a:p>
-                      <a:pPr algn="l"/>
-                      <a:r>
-                        <a:rPr lang="en-SG" sz="1600" dirty="0"/>
-                        <a:t>65.445076</a:t>
-                      </a:r>
-                    </a:p>
-                  </a:txBody>
-                  <a:tcPr>
-                    <a:solidFill>
-                      <a:srgbClr val="FFFF00"/>
-                    </a:solidFill>
-                  </a:tcPr>
-                </a:tc>
-                <a:tc>
-                  <a:txBody>
-                    <a:bodyPr/>
-                    <a:lstStyle/>
-                    <a:p>
-                      <a:pPr algn="l"/>
-                      <a:r>
-                        <a:rPr lang="en-SG" sz="1600" dirty="0"/>
-                        <a:t>8</a:t>
-                      </a:r>
-                    </a:p>
-                  </a:txBody>
-                  <a:tcPr>
-                    <a:solidFill>
-                      <a:srgbClr val="FFFF00"/>
-                    </a:solidFill>
-                  </a:tcPr>
-                </a:tc>
-                <a:extLst>
-                  <a:ext uri="{0D108BD9-81ED-4DB2-BD59-A6C34878D82A}">
-                    <a16:rowId xmlns:a16="http://schemas.microsoft.com/office/drawing/2014/main" val="3628976853"/>
-                  </a:ext>
-                </a:extLst>
-              </a:tr>
-              <a:tr h="370840">
-                <a:tc>
-                  <a:txBody>
-                    <a:bodyPr/>
-                    <a:lstStyle/>
-                    <a:p>
-                      <a:pPr algn="l"/>
-                      <a:r>
-                        <a:rPr lang="en-SG" sz="1600" dirty="0"/>
-                        <a:t>Mean</a:t>
-                      </a:r>
-                    </a:p>
-                  </a:txBody>
-                  <a:tcPr>
-                    <a:solidFill>
-                      <a:srgbClr val="FFFF00"/>
-                    </a:solidFill>
-                  </a:tcPr>
-                </a:tc>
-                <a:tc>
-                  <a:txBody>
-                    <a:bodyPr/>
-                    <a:lstStyle/>
-                    <a:p>
-                      <a:pPr algn="l"/>
-                      <a:r>
-                        <a:rPr lang="en-SG" sz="1600" dirty="0"/>
-                        <a:t>ML</a:t>
-                      </a:r>
-                    </a:p>
-                  </a:txBody>
-                  <a:tcPr>
-                    <a:solidFill>
-                      <a:srgbClr val="FFFF00"/>
-                    </a:solidFill>
-                  </a:tcPr>
-                </a:tc>
-                <a:tc>
-                  <a:txBody>
-                    <a:bodyPr/>
-                    <a:lstStyle/>
-                    <a:p>
-                      <a:pPr algn="l"/>
-                      <a:r>
-                        <a:rPr lang="en-SG" sz="1600" dirty="0"/>
-                        <a:t>40.938049	</a:t>
-                      </a:r>
-                    </a:p>
-                  </a:txBody>
-                  <a:tcPr>
-                    <a:solidFill>
-                      <a:srgbClr val="FFFF00"/>
-                    </a:solidFill>
-                  </a:tcPr>
-                </a:tc>
-                <a:tc>
-                  <a:txBody>
-                    <a:bodyPr/>
-                    <a:lstStyle/>
-                    <a:p>
-                      <a:pPr algn="l"/>
-                      <a:r>
-                        <a:rPr lang="en-SG" sz="1600" dirty="0"/>
-                        <a:t>23.891547</a:t>
-                      </a:r>
-                    </a:p>
-                  </a:txBody>
-                  <a:tcPr>
-                    <a:solidFill>
-                      <a:srgbClr val="FFFF00"/>
-                    </a:solidFill>
-                  </a:tcPr>
-                </a:tc>
-                <a:tc>
-                  <a:txBody>
-                    <a:bodyPr/>
-                    <a:lstStyle/>
-                    <a:p>
-                      <a:pPr algn="l"/>
-                      <a:r>
-                        <a:rPr lang="en-SG" sz="1600" dirty="0"/>
-                        <a:t>0</a:t>
-                      </a:r>
-                    </a:p>
-                  </a:txBody>
-                  <a:tcPr>
-                    <a:solidFill>
-                      <a:srgbClr val="FFFF00"/>
-                    </a:solidFill>
-                  </a:tcPr>
-                </a:tc>
-                <a:tc>
-                  <a:txBody>
-                    <a:bodyPr/>
-                    <a:lstStyle/>
-                    <a:p>
-                      <a:pPr algn="l"/>
-                      <a:r>
-                        <a:rPr lang="en-SG" sz="1600" dirty="0"/>
-                        <a:t>5</a:t>
-                      </a:r>
-                    </a:p>
-                  </a:txBody>
-                  <a:tcPr>
-                    <a:solidFill>
-                      <a:srgbClr val="FFFF00"/>
-                    </a:solidFill>
-                  </a:tcPr>
-                </a:tc>
-                <a:tc>
-                  <a:txBody>
-                    <a:bodyPr/>
-                    <a:lstStyle/>
-                    <a:p>
-                      <a:pPr algn="l"/>
-                      <a:r>
-                        <a:rPr lang="en-SG" sz="1600" dirty="0"/>
-                        <a:t>5</a:t>
-                      </a:r>
-                    </a:p>
-                  </a:txBody>
-                  <a:tcPr>
-                    <a:solidFill>
-                      <a:srgbClr val="FFFF00"/>
-                    </a:solidFill>
-                  </a:tcPr>
-                </a:tc>
-                <a:tc>
-                  <a:txBody>
-                    <a:bodyPr/>
-                    <a:lstStyle/>
-                    <a:p>
-                      <a:pPr algn="l" fontAlgn="ctr"/>
-                      <a:r>
-                        <a:rPr lang="en-SG" sz="1600" dirty="0">
-                          <a:effectLst/>
-                        </a:rPr>
-                        <a:t>0</a:t>
-                      </a:r>
-                    </a:p>
-                  </a:txBody>
-                  <a:tcPr anchor="ctr">
-                    <a:solidFill>
-                      <a:srgbClr val="FFFF00"/>
-                    </a:solidFill>
-                  </a:tcPr>
-                </a:tc>
-                <a:tc>
-                  <a:txBody>
-                    <a:bodyPr/>
-                    <a:lstStyle/>
-                    <a:p>
-                      <a:pPr algn="l"/>
-                      <a:r>
-                        <a:rPr lang="en-SG" sz="1600"/>
-                        <a:t>0.426661</a:t>
-                      </a:r>
-                      <a:r>
-                        <a:rPr lang="en-SG" sz="1600" dirty="0"/>
-                        <a:t>	</a:t>
-                      </a:r>
-                    </a:p>
-                  </a:txBody>
-                  <a:tcPr>
-                    <a:solidFill>
-                      <a:srgbClr val="FFFF00"/>
+                      <a:srgbClr val="CFD5EA"/>
+                    </a:solidFill>
+                  </a:tcPr>
+                </a:tc>
+                <a:tc>
+                  <a:txBody>
+                    <a:bodyPr/>
+                    <a:lstStyle/>
+                    <a:p>
+                      <a:pPr algn="l"/>
+                      <a:r>
+                        <a:rPr lang="en-SG" sz="1600" dirty="0"/>
+                        <a:t>-1.971863	</a:t>
+                      </a:r>
+                    </a:p>
+                  </a:txBody>
+                  <a:tcPr>
+                    <a:solidFill>
+                      <a:srgbClr val="CFD5EA"/>
                     </a:solidFill>
                   </a:tcPr>
                 </a:tc>
@@ -7020,7 +6810,7 @@
                   </a:txBody>
                   <a:tcPr>
                     <a:solidFill>
-                      <a:srgbClr val="FFFF00"/>
+                      <a:srgbClr val="CFD5EA"/>
                     </a:solidFill>
                   </a:tcPr>
                 </a:tc>
@@ -7038,7 +6828,7 @@
                   </a:txBody>
                   <a:tcPr>
                     <a:solidFill>
-                      <a:srgbClr val="FFFF00"/>
+                      <a:srgbClr val="CFD5EA"/>
                     </a:solidFill>
                   </a:tcPr>
                 </a:tc>
@@ -7406,10 +7196,10 @@
       </p:grpSpPr>
       <p:pic>
         <p:nvPicPr>
-          <p:cNvPr id="3" name="Picture 2">
+          <p:cNvPr id="4" name="Picture 3" descr="A picture containing line, plot, text, diagram&#10;&#10;Description automatically generated">
             <a:extLst>
               <a:ext uri="{FF2B5EF4-FFF2-40B4-BE49-F238E27FC236}">
-                <a16:creationId xmlns:a16="http://schemas.microsoft.com/office/drawing/2014/main" id="{4D455D8F-3CE0-A86E-2D51-897DBDDF3079}"/>
+                <a16:creationId xmlns:a16="http://schemas.microsoft.com/office/drawing/2014/main" id="{3A8951DD-4E8B-DB2B-9E69-AAFE99F7D68B}"/>
               </a:ext>
             </a:extLst>
           </p:cNvPr>
@@ -7426,13 +7216,50 @@
               </a:ext>
             </a:extLst>
           </a:blip>
-          <a:srcRect/>
-          <a:stretch/>
+          <a:stretch>
+            <a:fillRect/>
+          </a:stretch>
         </p:blipFill>
         <p:spPr>
           <a:xfrm>
-            <a:off x="266701" y="320039"/>
-            <a:ext cx="11658598" cy="6217919"/>
+            <a:off x="0" y="0"/>
+            <a:ext cx="12192000" cy="3251200"/>
+          </a:xfrm>
+          <a:prstGeom prst="rect">
+            <a:avLst/>
+          </a:prstGeom>
+        </p:spPr>
+      </p:pic>
+      <p:pic>
+        <p:nvPicPr>
+          <p:cNvPr id="6" name="Picture 5" descr="A picture containing line, diagram, plot, screenshot&#10;&#10;Description automatically generated">
+            <a:extLst>
+              <a:ext uri="{FF2B5EF4-FFF2-40B4-BE49-F238E27FC236}">
+                <a16:creationId xmlns:a16="http://schemas.microsoft.com/office/drawing/2014/main" id="{CAF98270-7DB5-5EE9-7AAF-60F2471DC666}"/>
+              </a:ext>
+            </a:extLst>
+          </p:cNvPr>
+          <p:cNvPicPr>
+            <a:picLocks noChangeAspect="1"/>
+          </p:cNvPicPr>
+          <p:nvPr/>
+        </p:nvPicPr>
+        <p:blipFill>
+          <a:blip r:embed="rId3">
+            <a:extLst>
+              <a:ext uri="{28A0092B-C50C-407E-A947-70E740481C1C}">
+                <a14:useLocalDpi xmlns:a14="http://schemas.microsoft.com/office/drawing/2010/main" val="0"/>
+              </a:ext>
+            </a:extLst>
+          </a:blip>
+          <a:stretch>
+            <a:fillRect/>
+          </a:stretch>
+        </p:blipFill>
+        <p:spPr>
+          <a:xfrm>
+            <a:off x="0" y="3606800"/>
+            <a:ext cx="12192000" cy="3251200"/>
           </a:xfrm>
           <a:prstGeom prst="rect">
             <a:avLst/>
@@ -7484,14 +7311,14 @@
           <p:nvPr>
             <p:extLst>
               <p:ext uri="{D42A27DB-BD31-4B8C-83A1-F6EECF244321}">
-                <p14:modId xmlns:p14="http://schemas.microsoft.com/office/powerpoint/2010/main" val="448849653"/>
+                <p14:modId xmlns:p14="http://schemas.microsoft.com/office/powerpoint/2010/main" val="1297221790"/>
               </p:ext>
             </p:extLst>
           </p:nvPr>
         </p:nvGraphicFramePr>
         <p:xfrm>
-          <a:off x="0" y="1431063"/>
-          <a:ext cx="12192004" cy="4531360"/>
+          <a:off x="0" y="2955069"/>
+          <a:ext cx="12192004" cy="3896360"/>
         </p:xfrm>
         <a:graphic>
           <a:graphicData uri="http://schemas.openxmlformats.org/drawingml/2006/table">
@@ -7556,14 +7383,14 @@
                     </a:ext>
                   </a:extLst>
                 </a:gridCol>
-                <a:gridCol w="1286934">
+                <a:gridCol w="1049867">
                   <a:extLst>
                     <a:ext uri="{9D8B030D-6E8A-4147-A177-3AD203B41FA5}">
                       <a16:colId xmlns:a16="http://schemas.microsoft.com/office/drawing/2014/main" val="1970964562"/>
                     </a:ext>
                   </a:extLst>
                 </a:gridCol>
-                <a:gridCol w="1296173">
+                <a:gridCol w="1533240">
                   <a:extLst>
                     <a:ext uri="{9D8B030D-6E8A-4147-A177-3AD203B41FA5}">
                       <a16:colId xmlns:a16="http://schemas.microsoft.com/office/drawing/2014/main" val="4241872789"/>
@@ -7586,7 +7413,7 @@
                     <a:p>
                       <a:pPr algn="l"/>
                       <a:r>
-                        <a:rPr lang="en-SG" sz="1600" dirty="0"/>
+                        <a:rPr lang="en-SG" sz="1400" dirty="0"/>
                         <a:t>Viscosity Standard 505 – Best parameters according to volume pipetted experiment 2</a:t>
                       </a:r>
                     </a:p>
@@ -7699,15 +7526,15 @@
                   </a:ext>
                 </a:extLst>
               </a:tr>
-              <a:tr h="370840">
-                <a:tc>
-                  <a:txBody>
-                    <a:bodyPr/>
-                    <a:lstStyle/>
-                    <a:p>
-                      <a:pPr algn="l"/>
-                      <a:r>
-                        <a:rPr lang="en-SG" sz="1600" dirty="0"/>
+              <a:tr h="256540">
+                <a:tc>
+                  <a:txBody>
+                    <a:bodyPr/>
+                    <a:lstStyle/>
+                    <a:p>
+                      <a:pPr algn="l"/>
+                      <a:r>
+                        <a:rPr lang="en-SG" sz="1400" dirty="0"/>
                         <a:t>Volume</a:t>
                       </a:r>
                     </a:p>
@@ -7721,7 +7548,7 @@
                     <a:p>
                       <a:pPr algn="l"/>
                       <a:r>
-                        <a:rPr lang="en-SG" sz="1600" dirty="0"/>
+                        <a:rPr lang="en-SG" sz="1400" dirty="0"/>
                         <a:t>ML or Human</a:t>
                       </a:r>
                     </a:p>
@@ -7735,7 +7562,7 @@
                     <a:p>
                       <a:pPr algn="l"/>
                       <a:r>
-                        <a:rPr lang="en-SG" sz="1600" dirty="0"/>
+                        <a:rPr lang="en-SG" sz="1400" dirty="0"/>
                         <a:t>Aspiration Rate</a:t>
                       </a:r>
                     </a:p>
@@ -7749,7 +7576,7 @@
                     <a:p>
                       <a:pPr algn="l"/>
                       <a:r>
-                        <a:rPr lang="en-SG" sz="1600" dirty="0"/>
+                        <a:rPr lang="en-SG" sz="1400" dirty="0"/>
                         <a:t>Dispense Rate</a:t>
                       </a:r>
                     </a:p>
@@ -7763,7 +7590,7 @@
                     <a:p>
                       <a:pPr algn="l"/>
                       <a:r>
-                        <a:rPr lang="en-SG" sz="1600" dirty="0"/>
+                        <a:rPr lang="en-SG" sz="1400" dirty="0"/>
                         <a:t>Blow Out Rate</a:t>
                       </a:r>
                     </a:p>
@@ -7777,7 +7604,7 @@
                     <a:p>
                       <a:pPr algn="l"/>
                       <a:r>
-                        <a:rPr lang="en-SG" sz="1600" dirty="0"/>
+                        <a:rPr lang="en-SG" sz="1400" dirty="0"/>
                         <a:t>Delay Aspirate</a:t>
                       </a:r>
                     </a:p>
@@ -7791,7 +7618,7 @@
                     <a:p>
                       <a:pPr algn="l"/>
                       <a:r>
-                        <a:rPr lang="en-SG" sz="1600" dirty="0"/>
+                        <a:rPr lang="en-SG" sz="1400" dirty="0"/>
                         <a:t>Delay Dispense</a:t>
                       </a:r>
                     </a:p>
@@ -7805,7 +7632,7 @@
                     <a:p>
                       <a:pPr algn="l"/>
                       <a:r>
-                        <a:rPr lang="en-SG" sz="1600" dirty="0"/>
+                        <a:rPr lang="en-SG" sz="1400" dirty="0"/>
                         <a:t>Delay Blow Out</a:t>
                       </a:r>
                     </a:p>
@@ -7819,7 +7646,7 @@
                     <a:p>
                       <a:pPr algn="l"/>
                       <a:r>
-                        <a:rPr lang="en-SG" sz="1600" dirty="0"/>
+                        <a:rPr lang="en-SG" sz="1400" dirty="0"/>
                         <a:t>%error</a:t>
                       </a:r>
                     </a:p>
@@ -7833,26 +7660,26 @@
                     <a:p>
                       <a:pPr algn="l"/>
                       <a:r>
-                        <a:rPr lang="en-SG" sz="1600" dirty="0"/>
+                        <a:rPr lang="en-SG" sz="1400" dirty="0"/>
                         <a:t>Total Time for transfer 1000 </a:t>
                       </a:r>
                       <a:r>
-                        <a:rPr lang="en-SG" sz="1600" dirty="0" err="1"/>
+                        <a:rPr lang="en-SG" sz="1400" dirty="0" err="1"/>
                         <a:t>ul</a:t>
                       </a:r>
-                      <a:endParaRPr lang="en-SG" sz="1600" dirty="0"/>
-                    </a:p>
-                  </a:txBody>
-                  <a:tcPr/>
-                </a:tc>
-                <a:tc>
-                  <a:txBody>
-                    <a:bodyPr/>
-                    <a:lstStyle/>
-                    <a:p>
-                      <a:pPr algn="l"/>
-                      <a:r>
-                        <a:rPr lang="en-SG" sz="1600" dirty="0"/>
+                      <a:endParaRPr lang="en-SG" sz="1400" dirty="0"/>
+                    </a:p>
+                  </a:txBody>
+                  <a:tcPr/>
+                </a:tc>
+                <a:tc>
+                  <a:txBody>
+                    <a:bodyPr/>
+                    <a:lstStyle/>
+                    <a:p>
+                      <a:pPr algn="l"/>
+                      <a:r>
+                        <a:rPr lang="en-SG" sz="1400" dirty="0"/>
                         <a:t>Iteration</a:t>
                       </a:r>
                     </a:p>
@@ -7865,15 +7692,15 @@
                   </a:ext>
                 </a:extLst>
               </a:tr>
-              <a:tr h="370840">
-                <a:tc>
-                  <a:txBody>
-                    <a:bodyPr/>
-                    <a:lstStyle/>
-                    <a:p>
-                      <a:pPr algn="l"/>
-                      <a:r>
-                        <a:rPr lang="en-SG" sz="1600" dirty="0"/>
+              <a:tr h="0">
+                <a:tc>
+                  <a:txBody>
+                    <a:bodyPr/>
+                    <a:lstStyle/>
+                    <a:p>
+                      <a:pPr algn="l"/>
+                      <a:r>
+                        <a:rPr lang="en-SG" sz="1400" dirty="0"/>
                         <a:t>300</a:t>
                       </a:r>
                     </a:p>
@@ -7891,7 +7718,7 @@
                     <a:p>
                       <a:pPr algn="l"/>
                       <a:r>
-                        <a:rPr lang="en-SG" sz="1600" dirty="0"/>
+                        <a:rPr lang="en-SG" sz="1400" dirty="0"/>
                         <a:t>ML</a:t>
                       </a:r>
                     </a:p>
@@ -7909,7 +7736,7 @@
                     <a:p>
                       <a:pPr algn="l"/>
                       <a:r>
-                        <a:rPr lang="en-SG" sz="1600" dirty="0"/>
+                        <a:rPr lang="en-SG" sz="1400" dirty="0"/>
                         <a:t>49.815477</a:t>
                       </a:r>
                     </a:p>
@@ -7927,7 +7754,7 @@
                     <a:p>
                       <a:pPr algn="l" fontAlgn="ctr"/>
                       <a:r>
-                        <a:rPr lang="en-SG" sz="1600" dirty="0">
+                        <a:rPr lang="en-SG" sz="1400" dirty="0">
                           <a:effectLst/>
                         </a:rPr>
                         <a:t>14.513244</a:t>
@@ -7947,7 +7774,7 @@
                     <a:p>
                       <a:pPr algn="l"/>
                       <a:r>
-                        <a:rPr lang="en-SG" sz="1600" dirty="0"/>
+                        <a:rPr lang="en-SG" sz="1400" dirty="0"/>
                         <a:t>0</a:t>
                       </a:r>
                     </a:p>
@@ -7965,7 +7792,7 @@
                     <a:p>
                       <a:pPr algn="l"/>
                       <a:r>
-                        <a:rPr lang="en-SG" sz="1600" dirty="0"/>
+                        <a:rPr lang="en-SG" sz="1400" dirty="0"/>
                         <a:t>5</a:t>
                       </a:r>
                     </a:p>
@@ -7983,7 +7810,7 @@
                     <a:p>
                       <a:pPr algn="l"/>
                       <a:r>
-                        <a:rPr lang="en-SG" sz="1600" dirty="0"/>
+                        <a:rPr lang="en-SG" sz="1400" dirty="0"/>
                         <a:t>5</a:t>
                       </a:r>
                     </a:p>
@@ -8001,7 +7828,7 @@
                     <a:p>
                       <a:pPr algn="l" fontAlgn="ctr"/>
                       <a:r>
-                        <a:rPr lang="en-SG" sz="1600" dirty="0">
+                        <a:rPr lang="en-SG" sz="1400" dirty="0">
                           <a:effectLst/>
                         </a:rPr>
                         <a:t>0</a:t>
@@ -8021,10 +7848,10 @@
                     <a:p>
                       <a:pPr algn="l" fontAlgn="ctr"/>
                       <a:r>
-                        <a:rPr lang="en-SG" sz="1600" dirty="0">
+                        <a:rPr lang="en-SG" sz="1400" dirty="0">
                           <a:effectLst/>
                         </a:rPr>
-                        <a:t>-1.877231	</a:t>
+                        <a:t>-1.877231</a:t>
                       </a:r>
                     </a:p>
                   </a:txBody>
@@ -8041,7 +7868,7 @@
                     <a:p>
                       <a:pPr algn="l"/>
                       <a:r>
-                        <a:rPr lang="en-SG" sz="1600" dirty="0"/>
+                        <a:rPr lang="en-SG" sz="1400" dirty="0"/>
                         <a:t>98.976668	</a:t>
                       </a:r>
                     </a:p>
@@ -8059,7 +7886,7 @@
                     <a:p>
                       <a:pPr algn="l"/>
                       <a:r>
-                        <a:rPr lang="en-SG" sz="1600" dirty="0"/>
+                        <a:rPr lang="en-SG" sz="1400" dirty="0"/>
                         <a:t>9</a:t>
                       </a:r>
                     </a:p>
@@ -8076,15 +7903,15 @@
                   </a:ext>
                 </a:extLst>
               </a:tr>
-              <a:tr h="370840">
-                <a:tc>
-                  <a:txBody>
-                    <a:bodyPr/>
-                    <a:lstStyle/>
-                    <a:p>
-                      <a:pPr algn="l"/>
-                      <a:r>
-                        <a:rPr lang="en-SG" sz="1600" dirty="0"/>
+              <a:tr h="228600">
+                <a:tc>
+                  <a:txBody>
+                    <a:bodyPr/>
+                    <a:lstStyle/>
+                    <a:p>
+                      <a:pPr algn="l"/>
+                      <a:r>
+                        <a:rPr lang="en-SG" sz="1400" dirty="0"/>
                         <a:t>300</a:t>
                       </a:r>
                     </a:p>
@@ -8098,7 +7925,7 @@
                     <a:p>
                       <a:pPr algn="l"/>
                       <a:r>
-                        <a:rPr lang="en-SG" sz="1600" dirty="0"/>
+                        <a:rPr lang="en-SG" sz="1400" dirty="0"/>
                         <a:t>Human</a:t>
                       </a:r>
                     </a:p>
@@ -8112,7 +7939,7 @@
                     <a:p>
                       <a:pPr algn="l"/>
                       <a:r>
-                        <a:rPr lang="en-SG" sz="1600" dirty="0"/>
+                        <a:rPr lang="en-SG" sz="1400" dirty="0"/>
                         <a:t>41</a:t>
                       </a:r>
                     </a:p>
@@ -8126,7 +7953,7 @@
                     <a:p>
                       <a:pPr algn="l"/>
                       <a:r>
-                        <a:rPr lang="en-SG" sz="1600" dirty="0"/>
+                        <a:rPr lang="en-SG" sz="1400" dirty="0"/>
                         <a:t>43</a:t>
                       </a:r>
                     </a:p>
@@ -8140,7 +7967,7 @@
                     <a:p>
                       <a:pPr algn="l"/>
                       <a:r>
-                        <a:rPr lang="en-SG" sz="1600" dirty="0"/>
+                        <a:rPr lang="en-SG" sz="1400" dirty="0"/>
                         <a:t>5</a:t>
                       </a:r>
                     </a:p>
@@ -8154,7 +7981,7 @@
                     <a:p>
                       <a:pPr algn="l"/>
                       <a:r>
-                        <a:rPr lang="en-SG" sz="1600" dirty="0"/>
+                        <a:rPr lang="en-SG" sz="1400" dirty="0"/>
                         <a:t>4</a:t>
                       </a:r>
                     </a:p>
@@ -8168,7 +7995,7 @@
                     <a:p>
                       <a:pPr algn="l"/>
                       <a:r>
-                        <a:rPr lang="en-SG" sz="1600" dirty="0"/>
+                        <a:rPr lang="en-SG" sz="1400" dirty="0"/>
                         <a:t>2.5</a:t>
                       </a:r>
                     </a:p>
@@ -8182,7 +8009,7 @@
                     <a:p>
                       <a:pPr algn="l"/>
                       <a:r>
-                        <a:rPr lang="en-SG" sz="1600" dirty="0"/>
+                        <a:rPr lang="en-SG" sz="1400" dirty="0"/>
                         <a:t>0</a:t>
                       </a:r>
                     </a:p>
@@ -8196,21 +8023,21 @@
                     <a:p>
                       <a:pPr algn="l"/>
                       <a:r>
-                        <a:rPr lang="en-SG" sz="1600" dirty="0"/>
-                        <a:t>1.078736	</a:t>
-                      </a:r>
-                    </a:p>
-                  </a:txBody>
-                  <a:tcPr/>
-                </a:tc>
-                <a:tc>
-                  <a:txBody>
-                    <a:bodyPr/>
-                    <a:lstStyle/>
-                    <a:p>
-                      <a:pPr algn="l"/>
-                      <a:r>
-                        <a:rPr lang="en-SG" sz="1600" dirty="0"/>
+                        <a:rPr lang="en-SG" sz="1400" dirty="0"/>
+                        <a:t>1.078736</a:t>
+                      </a:r>
+                    </a:p>
+                  </a:txBody>
+                  <a:tcPr/>
+                </a:tc>
+                <a:tc>
+                  <a:txBody>
+                    <a:bodyPr/>
+                    <a:lstStyle/>
+                    <a:p>
+                      <a:pPr algn="l"/>
+                      <a:r>
+                        <a:rPr lang="en-SG" sz="1400" dirty="0"/>
                         <a:t>84.146058	</a:t>
                       </a:r>
                     </a:p>
@@ -8224,7 +8051,7 @@
                     <a:p>
                       <a:pPr algn="l"/>
                       <a:r>
-                        <a:rPr lang="en-SG" sz="1600" dirty="0"/>
+                        <a:rPr lang="en-SG" sz="1400" dirty="0"/>
                         <a:t>21</a:t>
                       </a:r>
                     </a:p>
@@ -8245,7 +8072,7 @@
                     <a:p>
                       <a:pPr algn="l"/>
                       <a:r>
-                        <a:rPr lang="en-SG" sz="1600" dirty="0"/>
+                        <a:rPr lang="en-SG" sz="1400" dirty="0"/>
                         <a:t>500</a:t>
                       </a:r>
                     </a:p>
@@ -8263,7 +8090,7 @@
                     <a:p>
                       <a:pPr algn="l"/>
                       <a:r>
-                        <a:rPr lang="en-SG" sz="1600" dirty="0"/>
+                        <a:rPr lang="en-SG" sz="1400" dirty="0"/>
                         <a:t>ML</a:t>
                       </a:r>
                     </a:p>
@@ -8281,7 +8108,7 @@
                     <a:p>
                       <a:pPr algn="l"/>
                       <a:r>
-                        <a:rPr lang="en-SG" sz="1600" dirty="0"/>
+                        <a:rPr lang="en-SG" sz="1400" dirty="0"/>
                         <a:t>52.997340</a:t>
                       </a:r>
                     </a:p>
@@ -8299,7 +8126,7 @@
                     <a:p>
                       <a:pPr algn="l"/>
                       <a:r>
-                        <a:rPr lang="en-SG" sz="1600" dirty="0"/>
+                        <a:rPr lang="en-SG" sz="1400" dirty="0"/>
                         <a:t>11.122566	</a:t>
                       </a:r>
                     </a:p>
@@ -8317,7 +8144,7 @@
                     <a:p>
                       <a:pPr algn="l"/>
                       <a:r>
-                        <a:rPr lang="en-SG" sz="1600" dirty="0"/>
+                        <a:rPr lang="en-SG" sz="1400" dirty="0"/>
                         <a:t>0</a:t>
                       </a:r>
                     </a:p>
@@ -8335,7 +8162,7 @@
                     <a:p>
                       <a:pPr algn="l"/>
                       <a:r>
-                        <a:rPr lang="en-SG" sz="1600" dirty="0"/>
+                        <a:rPr lang="en-SG" sz="1400" dirty="0"/>
                         <a:t>5</a:t>
                       </a:r>
                     </a:p>
@@ -8353,7 +8180,7 @@
                     <a:p>
                       <a:pPr algn="l"/>
                       <a:r>
-                        <a:rPr lang="en-SG" sz="1600" dirty="0"/>
+                        <a:rPr lang="en-SG" sz="1400" dirty="0"/>
                         <a:t>5</a:t>
                       </a:r>
                     </a:p>
@@ -8371,7 +8198,7 @@
                     <a:p>
                       <a:pPr algn="l" fontAlgn="ctr"/>
                       <a:r>
-                        <a:rPr lang="en-SG" sz="1600" dirty="0">
+                        <a:rPr lang="en-SG" sz="1400" dirty="0">
                           <a:effectLst/>
                         </a:rPr>
                         <a:t>0</a:t>
@@ -8391,7 +8218,7 @@
                     <a:p>
                       <a:pPr algn="l"/>
                       <a:r>
-                        <a:rPr lang="en-SG" sz="1600" dirty="0"/>
+                        <a:rPr lang="en-SG" sz="1400" dirty="0"/>
                         <a:t>-2.084533</a:t>
                       </a:r>
                     </a:p>
@@ -8409,7 +8236,7 @@
                     <a:p>
                       <a:pPr algn="l"/>
                       <a:r>
-                        <a:rPr lang="en-SG" sz="1600" dirty="0"/>
+                        <a:rPr lang="en-SG" sz="1400" dirty="0"/>
                         <a:t>118.776184</a:t>
                       </a:r>
                     </a:p>
@@ -8427,7 +8254,7 @@
                     <a:p>
                       <a:pPr algn="l"/>
                       <a:r>
-                        <a:rPr lang="en-SG" sz="1600" dirty="0"/>
+                        <a:rPr lang="en-SG" sz="1400" dirty="0"/>
                         <a:t>9</a:t>
                       </a:r>
                     </a:p>
@@ -8452,7 +8279,7 @@
                     <a:p>
                       <a:pPr algn="l"/>
                       <a:r>
-                        <a:rPr lang="en-SG" sz="1600" dirty="0"/>
+                        <a:rPr lang="en-SG" sz="1400" dirty="0"/>
                         <a:t>500</a:t>
                       </a:r>
                     </a:p>
@@ -8470,7 +8297,7 @@
                     <a:p>
                       <a:pPr algn="l"/>
                       <a:r>
-                        <a:rPr lang="en-SG" sz="1600" dirty="0"/>
+                        <a:rPr lang="en-SG" sz="1400" dirty="0"/>
                         <a:t>ML</a:t>
                       </a:r>
                     </a:p>
@@ -8488,7 +8315,7 @@
                     <a:p>
                       <a:pPr algn="l"/>
                       <a:r>
-                        <a:rPr lang="en-SG" sz="1600" dirty="0"/>
+                        <a:rPr lang="en-SG" sz="1400" dirty="0"/>
                         <a:t>37.061581	</a:t>
                       </a:r>
                     </a:p>
@@ -8506,7 +8333,7 @@
                     <a:p>
                       <a:pPr algn="l"/>
                       <a:r>
-                        <a:rPr lang="en-SG" sz="1600" dirty="0"/>
+                        <a:rPr lang="en-SG" sz="1400" dirty="0"/>
                         <a:t>23.337657	</a:t>
                       </a:r>
                     </a:p>
@@ -8524,7 +8351,7 @@
                     <a:p>
                       <a:pPr algn="l"/>
                       <a:r>
-                        <a:rPr lang="en-SG" sz="1600" dirty="0"/>
+                        <a:rPr lang="en-SG" sz="1400" dirty="0"/>
                         <a:t>0</a:t>
                       </a:r>
                     </a:p>
@@ -8542,7 +8369,7 @@
                     <a:p>
                       <a:pPr algn="l"/>
                       <a:r>
-                        <a:rPr lang="en-SG" sz="1600" dirty="0"/>
+                        <a:rPr lang="en-SG" sz="1400" dirty="0"/>
                         <a:t>5</a:t>
                       </a:r>
                     </a:p>
@@ -8560,7 +8387,7 @@
                     <a:p>
                       <a:pPr algn="l"/>
                       <a:r>
-                        <a:rPr lang="en-SG" sz="1600" dirty="0"/>
+                        <a:rPr lang="en-SG" sz="1400" dirty="0"/>
                         <a:t>5</a:t>
                       </a:r>
                     </a:p>
@@ -8578,7 +8405,7 @@
                     <a:p>
                       <a:pPr algn="l" fontAlgn="ctr"/>
                       <a:r>
-                        <a:rPr lang="en-SG" sz="1600" dirty="0">
+                        <a:rPr lang="en-SG" sz="1400" dirty="0">
                           <a:effectLst/>
                         </a:rPr>
                         <a:t>0</a:t>
@@ -8598,8 +8425,8 @@
                     <a:p>
                       <a:pPr algn="l"/>
                       <a:r>
-                        <a:rPr lang="en-SG" sz="1600" dirty="0"/>
-                        <a:t>-2.383969	</a:t>
+                        <a:rPr lang="en-SG" sz="1400" dirty="0"/>
+                        <a:t>-2.383969</a:t>
                       </a:r>
                     </a:p>
                   </a:txBody>
@@ -8616,7 +8443,7 @@
                     <a:p>
                       <a:pPr algn="l"/>
                       <a:r>
-                        <a:rPr lang="en-SG" sz="1600" dirty="0"/>
+                        <a:rPr lang="en-SG" sz="1400" dirty="0"/>
                         <a:t>79.831322</a:t>
                       </a:r>
                     </a:p>
@@ -8634,7 +8461,7 @@
                     <a:p>
                       <a:pPr algn="l"/>
                       <a:r>
-                        <a:rPr lang="en-SG" sz="1600" dirty="0"/>
+                        <a:rPr lang="en-SG" sz="1400" dirty="0"/>
                         <a:t>10</a:t>
                       </a:r>
                     </a:p>
@@ -8651,15 +8478,15 @@
                   </a:ext>
                 </a:extLst>
               </a:tr>
-              <a:tr h="370840">
-                <a:tc>
-                  <a:txBody>
-                    <a:bodyPr/>
-                    <a:lstStyle/>
-                    <a:p>
-                      <a:pPr algn="l"/>
-                      <a:r>
-                        <a:rPr lang="en-SG" sz="1600" dirty="0"/>
+              <a:tr h="0">
+                <a:tc>
+                  <a:txBody>
+                    <a:bodyPr/>
+                    <a:lstStyle/>
+                    <a:p>
+                      <a:pPr algn="l"/>
+                      <a:r>
+                        <a:rPr lang="en-SG" sz="1400" dirty="0"/>
                         <a:t>500</a:t>
                       </a:r>
                     </a:p>
@@ -8673,7 +8500,7 @@
                     <a:p>
                       <a:pPr algn="l"/>
                       <a:r>
-                        <a:rPr lang="en-SG" sz="1600" dirty="0"/>
+                        <a:rPr lang="en-SG" sz="1400" dirty="0"/>
                         <a:t>Human</a:t>
                       </a:r>
                     </a:p>
@@ -8687,7 +8514,7 @@
                     <a:p>
                       <a:pPr algn="l"/>
                       <a:r>
-                        <a:rPr lang="en-SG" sz="1600" dirty="0"/>
+                        <a:rPr lang="en-SG" sz="1400" dirty="0"/>
                         <a:t>41.5</a:t>
                       </a:r>
                     </a:p>
@@ -8701,7 +8528,7 @@
                     <a:p>
                       <a:pPr algn="l"/>
                       <a:r>
-                        <a:rPr lang="en-SG" sz="1600" dirty="0"/>
+                        <a:rPr lang="en-SG" sz="1400" dirty="0"/>
                         <a:t>43</a:t>
                       </a:r>
                     </a:p>
@@ -8715,7 +8542,7 @@
                     <a:p>
                       <a:pPr algn="l"/>
                       <a:r>
-                        <a:rPr lang="en-SG" sz="1600" dirty="0"/>
+                        <a:rPr lang="en-SG" sz="1400" dirty="0"/>
                         <a:t>5</a:t>
                       </a:r>
                     </a:p>
@@ -8729,7 +8556,7 @@
                     <a:p>
                       <a:pPr algn="l"/>
                       <a:r>
-                        <a:rPr lang="en-SG" sz="1600" dirty="0"/>
+                        <a:rPr lang="en-SG" sz="1400" dirty="0"/>
                         <a:t>3</a:t>
                       </a:r>
                     </a:p>
@@ -8743,7 +8570,7 @@
                     <a:p>
                       <a:pPr algn="l"/>
                       <a:r>
-                        <a:rPr lang="en-SG" sz="1600" dirty="0"/>
+                        <a:rPr lang="en-SG" sz="1400" dirty="0"/>
                         <a:t>2.5</a:t>
                       </a:r>
                     </a:p>
@@ -8757,7 +8584,7 @@
                     <a:p>
                       <a:pPr algn="l"/>
                       <a:r>
-                        <a:rPr lang="en-SG" sz="1600" dirty="0"/>
+                        <a:rPr lang="en-SG" sz="1400" dirty="0"/>
                         <a:t>0</a:t>
                       </a:r>
                     </a:p>
@@ -8771,21 +8598,21 @@
                     <a:p>
                       <a:pPr algn="l"/>
                       <a:r>
-                        <a:rPr lang="en-SG" sz="1600" dirty="0"/>
-                        <a:t>-1.623863	</a:t>
-                      </a:r>
-                    </a:p>
-                  </a:txBody>
-                  <a:tcPr/>
-                </a:tc>
-                <a:tc>
-                  <a:txBody>
-                    <a:bodyPr/>
-                    <a:lstStyle/>
-                    <a:p>
-                      <a:pPr algn="l"/>
-                      <a:r>
-                        <a:rPr lang="en-SG" sz="1600" dirty="0"/>
+                        <a:rPr lang="en-SG" sz="1400" dirty="0"/>
+                        <a:t>-1.623863</a:t>
+                      </a:r>
+                    </a:p>
+                  </a:txBody>
+                  <a:tcPr/>
+                </a:tc>
+                <a:tc>
+                  <a:txBody>
+                    <a:bodyPr/>
+                    <a:lstStyle/>
+                    <a:p>
+                      <a:pPr algn="l"/>
+                      <a:r>
+                        <a:rPr lang="en-SG" sz="1400" dirty="0"/>
                         <a:t>82.852199	</a:t>
                       </a:r>
                     </a:p>
@@ -8799,7 +8626,7 @@
                     <a:p>
                       <a:pPr algn="l"/>
                       <a:r>
-                        <a:rPr lang="en-SG" sz="1600" dirty="0"/>
+                        <a:rPr lang="en-SG" sz="1400" dirty="0"/>
                         <a:t>13</a:t>
                       </a:r>
                     </a:p>
@@ -8820,7 +8647,7 @@
                     <a:p>
                       <a:pPr algn="l"/>
                       <a:r>
-                        <a:rPr lang="en-SG" sz="1600" dirty="0"/>
+                        <a:rPr lang="en-SG" sz="1400" dirty="0"/>
                         <a:t>1000</a:t>
                       </a:r>
                     </a:p>
@@ -8838,7 +8665,7 @@
                     <a:p>
                       <a:pPr algn="l"/>
                       <a:r>
-                        <a:rPr lang="en-SG" sz="1600" dirty="0"/>
+                        <a:rPr lang="en-SG" sz="1400" dirty="0"/>
                         <a:t>ML</a:t>
                       </a:r>
                     </a:p>
@@ -8856,7 +8683,7 @@
                     <a:p>
                       <a:pPr algn="l"/>
                       <a:r>
-                        <a:rPr lang="en-SG" sz="1600" dirty="0"/>
+                        <a:rPr lang="en-SG" sz="1400" dirty="0"/>
                         <a:t>36.438157</a:t>
                       </a:r>
                     </a:p>
@@ -8874,7 +8701,7 @@
                     <a:p>
                       <a:pPr algn="l"/>
                       <a:r>
-                        <a:rPr lang="en-SG" sz="1600" dirty="0"/>
+                        <a:rPr lang="en-SG" sz="1400" dirty="0"/>
                         <a:t>10.967022</a:t>
                       </a:r>
                     </a:p>
@@ -8892,7 +8719,7 @@
                     <a:p>
                       <a:pPr algn="l"/>
                       <a:r>
-                        <a:rPr lang="en-SG" sz="1600" dirty="0"/>
+                        <a:rPr lang="en-SG" sz="1400" dirty="0"/>
                         <a:t>0</a:t>
                       </a:r>
                     </a:p>
@@ -8910,7 +8737,7 @@
                     <a:p>
                       <a:pPr algn="l"/>
                       <a:r>
-                        <a:rPr lang="en-SG" sz="1600" dirty="0"/>
+                        <a:rPr lang="en-SG" sz="1400" dirty="0"/>
                         <a:t>5</a:t>
                       </a:r>
                     </a:p>
@@ -8928,7 +8755,7 @@
                     <a:p>
                       <a:pPr algn="l"/>
                       <a:r>
-                        <a:rPr lang="en-SG" sz="1600" dirty="0"/>
+                        <a:rPr lang="en-SG" sz="1400" dirty="0"/>
                         <a:t>5</a:t>
                       </a:r>
                     </a:p>
@@ -8946,7 +8773,7 @@
                     <a:p>
                       <a:pPr algn="l" fontAlgn="ctr"/>
                       <a:r>
-                        <a:rPr lang="en-SG" sz="1600" dirty="0">
+                        <a:rPr lang="en-SG" sz="1400" dirty="0">
                           <a:effectLst/>
                         </a:rPr>
                         <a:t>0</a:t>
@@ -8966,7 +8793,7 @@
                     <a:p>
                       <a:pPr algn="l"/>
                       <a:r>
-                        <a:rPr lang="en-SG" sz="1600" dirty="0"/>
+                        <a:rPr lang="en-SG" sz="1400" dirty="0"/>
                         <a:t>-0.092134</a:t>
                       </a:r>
                     </a:p>
@@ -8984,7 +8811,7 @@
                     <a:p>
                       <a:pPr algn="l"/>
                       <a:r>
-                        <a:rPr lang="en-SG" sz="1600" dirty="0"/>
+                        <a:rPr lang="en-SG" sz="1400" dirty="0"/>
                         <a:t>128.626216</a:t>
                       </a:r>
                     </a:p>
@@ -9002,7 +8829,7 @@
                     <a:p>
                       <a:pPr algn="l"/>
                       <a:r>
-                        <a:rPr lang="en-SG" sz="1600" dirty="0"/>
+                        <a:rPr lang="en-SG" sz="1400" dirty="0"/>
                         <a:t>8</a:t>
                       </a:r>
                     </a:p>
@@ -9027,7 +8854,7 @@
                     <a:p>
                       <a:pPr algn="l"/>
                       <a:r>
-                        <a:rPr lang="en-SG" sz="1600" dirty="0"/>
+                        <a:rPr lang="en-SG" sz="1400" dirty="0"/>
                         <a:t>1000</a:t>
                       </a:r>
                     </a:p>
@@ -9045,7 +8872,7 @@
                     <a:p>
                       <a:pPr algn="l"/>
                       <a:r>
-                        <a:rPr lang="en-SG" sz="1600" dirty="0"/>
+                        <a:rPr lang="en-SG" sz="1400" dirty="0"/>
                         <a:t>ML</a:t>
                       </a:r>
                     </a:p>
@@ -9063,7 +8890,7 @@
                     <a:p>
                       <a:pPr algn="l"/>
                       <a:r>
-                        <a:rPr lang="en-SG" sz="1600" dirty="0"/>
+                        <a:rPr lang="en-SG" sz="1400" dirty="0"/>
                         <a:t>30.922621</a:t>
                       </a:r>
                     </a:p>
@@ -9081,7 +8908,7 @@
                     <a:p>
                       <a:pPr algn="l"/>
                       <a:r>
-                        <a:rPr lang="en-SG" sz="1600" dirty="0"/>
+                        <a:rPr lang="en-SG" sz="1400" dirty="0"/>
                         <a:t>13.340393	</a:t>
                       </a:r>
                     </a:p>
@@ -9099,7 +8926,7 @@
                     <a:p>
                       <a:pPr algn="l"/>
                       <a:r>
-                        <a:rPr lang="en-SG" sz="1600" dirty="0"/>
+                        <a:rPr lang="en-SG" sz="1400" dirty="0"/>
                         <a:t>0</a:t>
                       </a:r>
                     </a:p>
@@ -9117,7 +8944,7 @@
                     <a:p>
                       <a:pPr algn="l"/>
                       <a:r>
-                        <a:rPr lang="en-SG" sz="1600" dirty="0"/>
+                        <a:rPr lang="en-SG" sz="1400" dirty="0"/>
                         <a:t>5</a:t>
                       </a:r>
                     </a:p>
@@ -9135,7 +8962,7 @@
                     <a:p>
                       <a:pPr algn="l"/>
                       <a:r>
-                        <a:rPr lang="en-SG" sz="1600" dirty="0"/>
+                        <a:rPr lang="en-SG" sz="1400" dirty="0"/>
                         <a:t>5</a:t>
                       </a:r>
                     </a:p>
@@ -9153,7 +8980,7 @@
                     <a:p>
                       <a:pPr algn="l" fontAlgn="ctr"/>
                       <a:r>
-                        <a:rPr lang="en-SG" sz="1600" dirty="0">
+                        <a:rPr lang="en-SG" sz="1400" dirty="0">
                           <a:effectLst/>
                         </a:rPr>
                         <a:t>0</a:t>
@@ -9173,7 +9000,7 @@
                     <a:p>
                       <a:pPr algn="l"/>
                       <a:r>
-                        <a:rPr lang="en-SG" sz="1600" dirty="0"/>
+                        <a:rPr lang="en-SG" sz="1400" dirty="0"/>
                         <a:t>-0.368536</a:t>
                       </a:r>
                     </a:p>
@@ -9191,7 +9018,7 @@
                     <a:p>
                       <a:pPr algn="l"/>
                       <a:r>
-                        <a:rPr lang="en-SG" sz="1600" dirty="0"/>
+                        <a:rPr lang="en-SG" sz="1400" dirty="0"/>
                         <a:t>117.299094</a:t>
                       </a:r>
                     </a:p>
@@ -9209,7 +9036,7 @@
                     <a:p>
                       <a:pPr algn="l"/>
                       <a:r>
-                        <a:rPr lang="en-SG" sz="1600" dirty="0"/>
+                        <a:rPr lang="en-SG" sz="1400" dirty="0"/>
                         <a:t>10</a:t>
                       </a:r>
                     </a:p>
@@ -9226,15 +9053,15 @@
                   </a:ext>
                 </a:extLst>
               </a:tr>
-              <a:tr h="370840">
-                <a:tc>
-                  <a:txBody>
-                    <a:bodyPr/>
-                    <a:lstStyle/>
-                    <a:p>
-                      <a:pPr algn="l"/>
-                      <a:r>
-                        <a:rPr lang="en-SG" sz="1600" dirty="0"/>
+              <a:tr h="0">
+                <a:tc>
+                  <a:txBody>
+                    <a:bodyPr/>
+                    <a:lstStyle/>
+                    <a:p>
+                      <a:pPr algn="l"/>
+                      <a:r>
+                        <a:rPr lang="en-SG" sz="1400" dirty="0"/>
                         <a:t>1000</a:t>
                       </a:r>
                     </a:p>
@@ -9255,7 +9082,7 @@
                     <a:p>
                       <a:pPr algn="l"/>
                       <a:r>
-                        <a:rPr lang="en-SG" sz="1600" dirty="0"/>
+                        <a:rPr lang="en-SG" sz="1400" dirty="0"/>
                         <a:t>Human</a:t>
                       </a:r>
                     </a:p>
@@ -9276,7 +9103,7 @@
                     <a:p>
                       <a:pPr algn="l"/>
                       <a:r>
-                        <a:rPr lang="en-SG" sz="1600" dirty="0"/>
+                        <a:rPr lang="en-SG" sz="1400" dirty="0"/>
                         <a:t>43</a:t>
                       </a:r>
                     </a:p>
@@ -9297,7 +9124,7 @@
                     <a:p>
                       <a:pPr algn="l"/>
                       <a:r>
-                        <a:rPr lang="en-SG" sz="1600" dirty="0"/>
+                        <a:rPr lang="en-SG" sz="1400" dirty="0"/>
                         <a:t>43</a:t>
                       </a:r>
                     </a:p>
@@ -9318,7 +9145,7 @@
                     <a:p>
                       <a:pPr algn="l"/>
                       <a:r>
-                        <a:rPr lang="en-SG" sz="1600" dirty="0"/>
+                        <a:rPr lang="en-SG" sz="1400" dirty="0"/>
                         <a:t>5</a:t>
                       </a:r>
                     </a:p>
@@ -9339,7 +9166,7 @@
                     <a:p>
                       <a:pPr algn="l"/>
                       <a:r>
-                        <a:rPr lang="en-SG" sz="1600" dirty="0"/>
+                        <a:rPr lang="en-SG" sz="1400" dirty="0"/>
                         <a:t>3.5</a:t>
                       </a:r>
                     </a:p>
@@ -9360,7 +9187,7 @@
                     <a:p>
                       <a:pPr algn="l"/>
                       <a:r>
-                        <a:rPr lang="en-SG" sz="1600" dirty="0"/>
+                        <a:rPr lang="en-SG" sz="1400" dirty="0"/>
                         <a:t>3.5</a:t>
                       </a:r>
                     </a:p>
@@ -9381,7 +9208,7 @@
                     <a:p>
                       <a:pPr algn="l"/>
                       <a:r>
-                        <a:rPr lang="en-SG" sz="1600" dirty="0"/>
+                        <a:rPr lang="en-SG" sz="1400" dirty="0"/>
                         <a:t>0</a:t>
                       </a:r>
                     </a:p>
@@ -9402,8 +9229,8 @@
                     <a:p>
                       <a:pPr algn="l"/>
                       <a:r>
-                        <a:rPr lang="en-SG" sz="1600" dirty="0"/>
-                        <a:t>0.518254	</a:t>
+                        <a:rPr lang="en-SG" sz="1400" dirty="0"/>
+                        <a:t>0.518254</a:t>
                       </a:r>
                     </a:p>
                   </a:txBody>
@@ -9423,7 +9250,7 @@
                     <a:p>
                       <a:pPr algn="l"/>
                       <a:r>
-                        <a:rPr lang="en-SG" sz="1600" dirty="0"/>
+                        <a:rPr lang="en-SG" sz="1400" dirty="0"/>
                         <a:t>83.511628	</a:t>
                       </a:r>
                     </a:p>
@@ -9444,7 +9271,7 @@
                     <a:p>
                       <a:pPr algn="l"/>
                       <a:r>
-                        <a:rPr lang="en-SG" sz="1600" dirty="0"/>
+                        <a:rPr lang="en-SG" sz="1400" dirty="0"/>
                         <a:t>6</a:t>
                       </a:r>
                     </a:p>
@@ -9464,15 +9291,15 @@
                   </a:ext>
                 </a:extLst>
               </a:tr>
-              <a:tr h="370840">
-                <a:tc>
-                  <a:txBody>
-                    <a:bodyPr/>
-                    <a:lstStyle/>
-                    <a:p>
-                      <a:pPr algn="l"/>
-                      <a:r>
-                        <a:rPr lang="en-SG" sz="1600" dirty="0"/>
+              <a:tr h="0">
+                <a:tc>
+                  <a:txBody>
+                    <a:bodyPr/>
+                    <a:lstStyle/>
+                    <a:p>
+                      <a:pPr algn="l"/>
+                      <a:r>
+                        <a:rPr lang="en-SG" sz="1400" dirty="0"/>
                         <a:t>1000</a:t>
                       </a:r>
                     </a:p>
@@ -9493,7 +9320,7 @@
                     <a:p>
                       <a:pPr algn="l"/>
                       <a:r>
-                        <a:rPr lang="en-SG" sz="1600" dirty="0"/>
+                        <a:rPr lang="en-SG" sz="1400" dirty="0"/>
                         <a:t>Human</a:t>
                       </a:r>
                     </a:p>
@@ -9514,7 +9341,7 @@
                     <a:p>
                       <a:pPr algn="l"/>
                       <a:r>
-                        <a:rPr lang="en-SG" sz="1600" dirty="0"/>
+                        <a:rPr lang="en-SG" sz="1400" dirty="0"/>
                         <a:t>43</a:t>
                       </a:r>
                     </a:p>
@@ -9535,7 +9362,7 @@
                     <a:p>
                       <a:pPr algn="l"/>
                       <a:r>
-                        <a:rPr lang="en-SG" sz="1600" dirty="0"/>
+                        <a:rPr lang="en-SG" sz="1400" dirty="0"/>
                         <a:t>43</a:t>
                       </a:r>
                     </a:p>
@@ -9556,7 +9383,7 @@
                     <a:p>
                       <a:pPr algn="l"/>
                       <a:r>
-                        <a:rPr lang="en-SG" sz="1600" dirty="0"/>
+                        <a:rPr lang="en-SG" sz="1400" dirty="0"/>
                         <a:t>5</a:t>
                       </a:r>
                     </a:p>
@@ -9577,7 +9404,7 @@
                     <a:p>
                       <a:pPr algn="l"/>
                       <a:r>
-                        <a:rPr lang="en-SG" sz="1600" dirty="0"/>
+                        <a:rPr lang="en-SG" sz="1400" dirty="0"/>
                         <a:t>2.5</a:t>
                       </a:r>
                     </a:p>
@@ -9598,7 +9425,7 @@
                     <a:p>
                       <a:pPr algn="l"/>
                       <a:r>
-                        <a:rPr lang="en-SG" sz="1600" dirty="0"/>
+                        <a:rPr lang="en-SG" sz="1400" dirty="0"/>
                         <a:t>2.5</a:t>
                       </a:r>
                     </a:p>
@@ -9619,7 +9446,7 @@
                     <a:p>
                       <a:pPr algn="l"/>
                       <a:r>
-                        <a:rPr lang="en-SG" sz="1600" dirty="0"/>
+                        <a:rPr lang="en-SG" sz="1400" dirty="0"/>
                         <a:t>0</a:t>
                       </a:r>
                     </a:p>
@@ -9640,8 +9467,8 @@
                     <a:p>
                       <a:pPr algn="l"/>
                       <a:r>
-                        <a:rPr lang="en-SG" sz="1600" dirty="0"/>
-                        <a:t>0.564321	</a:t>
+                        <a:rPr lang="en-SG" sz="1400" dirty="0"/>
+                        <a:t>0.564321</a:t>
                       </a:r>
                     </a:p>
                   </a:txBody>
@@ -9661,7 +9488,7 @@
                     <a:p>
                       <a:pPr algn="l"/>
                       <a:r>
-                        <a:rPr lang="en-SG" sz="1600" dirty="0"/>
+                        <a:rPr lang="en-SG" sz="1400" dirty="0"/>
                         <a:t>81.511628</a:t>
                       </a:r>
                     </a:p>
@@ -9682,7 +9509,7 @@
                     <a:p>
                       <a:pPr algn="l"/>
                       <a:r>
-                        <a:rPr lang="en-SG" sz="1600" dirty="0"/>
+                        <a:rPr lang="en-SG" sz="1400" dirty="0"/>
                         <a:t>7</a:t>
                       </a:r>
                     </a:p>
@@ -9706,42 +9533,6 @@
           </a:graphicData>
         </a:graphic>
       </p:graphicFrame>
-      <p:sp>
-        <p:nvSpPr>
-          <p:cNvPr id="3" name="TextBox 2">
-            <a:extLst>
-              <a:ext uri="{FF2B5EF4-FFF2-40B4-BE49-F238E27FC236}">
-                <a16:creationId xmlns:a16="http://schemas.microsoft.com/office/drawing/2014/main" id="{1308D0C7-1A45-BA0F-910E-1B76483ABB3D}"/>
-              </a:ext>
-            </a:extLst>
-          </p:cNvPr>
-          <p:cNvSpPr txBox="1"/>
-          <p:nvPr/>
-        </p:nvSpPr>
-        <p:spPr>
-          <a:xfrm>
-            <a:off x="1786466" y="575733"/>
-            <a:ext cx="8619067" cy="369332"/>
-          </a:xfrm>
-          <a:prstGeom prst="rect">
-            <a:avLst/>
-          </a:prstGeom>
-          <a:noFill/>
-        </p:spPr>
-        <p:txBody>
-          <a:bodyPr wrap="square" rtlCol="0">
-            <a:spAutoFit/>
-          </a:bodyPr>
-          <a:lstStyle/>
-          <a:p>
-            <a:pPr algn="ctr"/>
-            <a:r>
-              <a:rPr lang="en-SG" dirty="0"/>
-              <a:t>All experiments we have touch tip for aspiration, no touch tip for dispense</a:t>
-            </a:r>
-          </a:p>
-        </p:txBody>
-      </p:sp>
       <mc:AlternateContent xmlns:mc="http://schemas.openxmlformats.org/markup-compatibility/2006" xmlns:p14="http://schemas.microsoft.com/office/powerpoint/2010/main">
         <mc:Choice Requires="p14">
           <p:contentPart p14:bwMode="auto" r:id="rId2">
@@ -9793,6 +9584,41 @@
           </p:pic>
         </mc:Fallback>
       </mc:AlternateContent>
+      <p:pic>
+        <p:nvPicPr>
+          <p:cNvPr id="7" name="Picture 6" descr="A picture containing line, text, plot, diagram&#10;&#10;Description automatically generated">
+            <a:extLst>
+              <a:ext uri="{FF2B5EF4-FFF2-40B4-BE49-F238E27FC236}">
+                <a16:creationId xmlns:a16="http://schemas.microsoft.com/office/drawing/2014/main" id="{93174736-023F-6772-7CC2-29DBE001697A}"/>
+              </a:ext>
+            </a:extLst>
+          </p:cNvPr>
+          <p:cNvPicPr>
+            <a:picLocks noChangeAspect="1"/>
+          </p:cNvPicPr>
+          <p:nvPr/>
+        </p:nvPicPr>
+        <p:blipFill rotWithShape="1">
+          <a:blip r:embed="rId4">
+            <a:extLst>
+              <a:ext uri="{28A0092B-C50C-407E-A947-70E740481C1C}">
+                <a14:useLocalDpi xmlns:a14="http://schemas.microsoft.com/office/drawing/2010/main" val="0"/>
+              </a:ext>
+            </a:extLst>
+          </a:blip>
+          <a:srcRect b="4564"/>
+          <a:stretch/>
+        </p:blipFill>
+        <p:spPr>
+          <a:xfrm>
+            <a:off x="299170" y="4514"/>
+            <a:ext cx="11593660" cy="2950555"/>
+          </a:xfrm>
+          <a:prstGeom prst="rect">
+            <a:avLst/>
+          </a:prstGeom>
+        </p:spPr>
+      </p:pic>
     </p:spTree>
     <p:extLst>
       <p:ext uri="{BB962C8B-B14F-4D97-AF65-F5344CB8AC3E}">
@@ -9825,10 +9651,10 @@
       </p:grpSpPr>
       <p:pic>
         <p:nvPicPr>
-          <p:cNvPr id="3" name="Picture 2">
+          <p:cNvPr id="4" name="Picture 3" descr="A screenshot of a graph&#10;&#10;Description automatically generated with low confidence">
             <a:extLst>
               <a:ext uri="{FF2B5EF4-FFF2-40B4-BE49-F238E27FC236}">
-                <a16:creationId xmlns:a16="http://schemas.microsoft.com/office/drawing/2014/main" id="{4D455D8F-3CE0-A86E-2D51-897DBDDF3079}"/>
+                <a16:creationId xmlns:a16="http://schemas.microsoft.com/office/drawing/2014/main" id="{ACCEC9A3-56FB-F432-A31B-D30A0EC15836}"/>
               </a:ext>
             </a:extLst>
           </p:cNvPr>
@@ -9845,13 +9671,14 @@
               </a:ext>
             </a:extLst>
           </a:blip>
-          <a:srcRect/>
-          <a:stretch/>
+          <a:stretch>
+            <a:fillRect/>
+          </a:stretch>
         </p:blipFill>
         <p:spPr>
           <a:xfrm>
-            <a:off x="266702" y="320040"/>
-            <a:ext cx="11658596" cy="6217918"/>
+            <a:off x="0" y="1803400"/>
+            <a:ext cx="12192000" cy="3251200"/>
           </a:xfrm>
           <a:prstGeom prst="rect">
             <a:avLst/>
@@ -12206,10 +12033,10 @@
       </p:grpSpPr>
       <p:pic>
         <p:nvPicPr>
-          <p:cNvPr id="3" name="Picture 2">
+          <p:cNvPr id="4" name="Picture 3" descr="A picture containing line, diagram, plot, text&#10;&#10;Description automatically generated">
             <a:extLst>
               <a:ext uri="{FF2B5EF4-FFF2-40B4-BE49-F238E27FC236}">
-                <a16:creationId xmlns:a16="http://schemas.microsoft.com/office/drawing/2014/main" id="{77A2B690-E628-DF1B-A6E9-EBD05D597FC5}"/>
+                <a16:creationId xmlns:a16="http://schemas.microsoft.com/office/drawing/2014/main" id="{4C844B5A-F4CB-8045-D8B4-A0364B8F24D6}"/>
               </a:ext>
             </a:extLst>
           </p:cNvPr>
@@ -12226,13 +12053,50 @@
               </a:ext>
             </a:extLst>
           </a:blip>
-          <a:srcRect/>
-          <a:stretch/>
+          <a:stretch>
+            <a:fillRect/>
+          </a:stretch>
         </p:blipFill>
         <p:spPr>
           <a:xfrm>
-            <a:off x="266700" y="320040"/>
-            <a:ext cx="11658600" cy="6217920"/>
+            <a:off x="0" y="177800"/>
+            <a:ext cx="12192000" cy="3251200"/>
+          </a:xfrm>
+          <a:prstGeom prst="rect">
+            <a:avLst/>
+          </a:prstGeom>
+        </p:spPr>
+      </p:pic>
+      <p:pic>
+        <p:nvPicPr>
+          <p:cNvPr id="6" name="Picture 5" descr="A picture containing line, diagram, plot, screenshot&#10;&#10;Description automatically generated">
+            <a:extLst>
+              <a:ext uri="{FF2B5EF4-FFF2-40B4-BE49-F238E27FC236}">
+                <a16:creationId xmlns:a16="http://schemas.microsoft.com/office/drawing/2014/main" id="{3D1CB8C1-AC27-DF1E-F4E2-EBC33F84BDBD}"/>
+              </a:ext>
+            </a:extLst>
+          </p:cNvPr>
+          <p:cNvPicPr>
+            <a:picLocks noChangeAspect="1"/>
+          </p:cNvPicPr>
+          <p:nvPr/>
+        </p:nvPicPr>
+        <p:blipFill>
+          <a:blip r:embed="rId3">
+            <a:extLst>
+              <a:ext uri="{28A0092B-C50C-407E-A947-70E740481C1C}">
+                <a14:useLocalDpi xmlns:a14="http://schemas.microsoft.com/office/drawing/2010/main" val="0"/>
+              </a:ext>
+            </a:extLst>
+          </a:blip>
+          <a:stretch>
+            <a:fillRect/>
+          </a:stretch>
+        </p:blipFill>
+        <p:spPr>
+          <a:xfrm>
+            <a:off x="0" y="3606801"/>
+            <a:ext cx="12192000" cy="3251200"/>
           </a:xfrm>
           <a:prstGeom prst="rect">
             <a:avLst/>
@@ -12284,13 +12148,13 @@
           <p:nvPr>
             <p:extLst>
               <p:ext uri="{D42A27DB-BD31-4B8C-83A1-F6EECF244321}">
-                <p14:modId xmlns:p14="http://schemas.microsoft.com/office/powerpoint/2010/main" val="3712493792"/>
+                <p14:modId xmlns:p14="http://schemas.microsoft.com/office/powerpoint/2010/main" val="3181341423"/>
               </p:ext>
             </p:extLst>
           </p:nvPr>
         </p:nvGraphicFramePr>
         <p:xfrm>
-          <a:off x="0" y="1431063"/>
+          <a:off x="0" y="3439160"/>
           <a:ext cx="12192004" cy="3418840"/>
         </p:xfrm>
         <a:graphic>
@@ -13833,42 +13697,6 @@
           </a:graphicData>
         </a:graphic>
       </p:graphicFrame>
-      <p:sp>
-        <p:nvSpPr>
-          <p:cNvPr id="3" name="TextBox 2">
-            <a:extLst>
-              <a:ext uri="{FF2B5EF4-FFF2-40B4-BE49-F238E27FC236}">
-                <a16:creationId xmlns:a16="http://schemas.microsoft.com/office/drawing/2014/main" id="{1308D0C7-1A45-BA0F-910E-1B76483ABB3D}"/>
-              </a:ext>
-            </a:extLst>
-          </p:cNvPr>
-          <p:cNvSpPr txBox="1"/>
-          <p:nvPr/>
-        </p:nvSpPr>
-        <p:spPr>
-          <a:xfrm>
-            <a:off x="1786466" y="575733"/>
-            <a:ext cx="8619067" cy="369332"/>
-          </a:xfrm>
-          <a:prstGeom prst="rect">
-            <a:avLst/>
-          </a:prstGeom>
-          <a:noFill/>
-        </p:spPr>
-        <p:txBody>
-          <a:bodyPr wrap="square" rtlCol="0">
-            <a:spAutoFit/>
-          </a:bodyPr>
-          <a:lstStyle/>
-          <a:p>
-            <a:pPr algn="ctr"/>
-            <a:r>
-              <a:rPr lang="en-SG" dirty="0"/>
-              <a:t>All experiments we have touch tip for aspiration, no touch tip for dispense</a:t>
-            </a:r>
-          </a:p>
-        </p:txBody>
-      </p:sp>
       <mc:AlternateContent xmlns:mc="http://schemas.openxmlformats.org/markup-compatibility/2006" xmlns:p14="http://schemas.microsoft.com/office/powerpoint/2010/main">
         <mc:Choice Requires="p14">
           <p:contentPart p14:bwMode="auto" r:id="rId2">
@@ -13920,6 +13748,41 @@
           </p:pic>
         </mc:Fallback>
       </mc:AlternateContent>
+      <p:pic>
+        <p:nvPicPr>
+          <p:cNvPr id="5" name="Picture 4" descr="A picture containing line, diagram, plot, text&#10;&#10;Description automatically generated">
+            <a:extLst>
+              <a:ext uri="{FF2B5EF4-FFF2-40B4-BE49-F238E27FC236}">
+                <a16:creationId xmlns:a16="http://schemas.microsoft.com/office/drawing/2014/main" id="{BD425E9D-D290-46E5-A0B7-F93566D5427F}"/>
+              </a:ext>
+            </a:extLst>
+          </p:cNvPr>
+          <p:cNvPicPr>
+            <a:picLocks noChangeAspect="1"/>
+          </p:cNvPicPr>
+          <p:nvPr/>
+        </p:nvPicPr>
+        <p:blipFill rotWithShape="1">
+          <a:blip r:embed="rId4">
+            <a:extLst>
+              <a:ext uri="{28A0092B-C50C-407E-A947-70E740481C1C}">
+                <a14:useLocalDpi xmlns:a14="http://schemas.microsoft.com/office/drawing/2010/main" val="0"/>
+              </a:ext>
+            </a:extLst>
+          </a:blip>
+          <a:srcRect b="2879"/>
+          <a:stretch/>
+        </p:blipFill>
+        <p:spPr>
+          <a:xfrm>
+            <a:off x="0" y="114300"/>
+            <a:ext cx="12192000" cy="3157620"/>
+          </a:xfrm>
+          <a:prstGeom prst="rect">
+            <a:avLst/>
+          </a:prstGeom>
+        </p:spPr>
+      </p:pic>
     </p:spTree>
     <p:extLst>
       <p:ext uri="{BB962C8B-B14F-4D97-AF65-F5344CB8AC3E}">
@@ -14238,10 +14101,10 @@
       </p:grpSpPr>
       <p:pic>
         <p:nvPicPr>
-          <p:cNvPr id="3" name="Picture 2">
+          <p:cNvPr id="4" name="Picture 3" descr="A picture containing text, line, diagram, plot&#10;&#10;Description automatically generated">
             <a:extLst>
               <a:ext uri="{FF2B5EF4-FFF2-40B4-BE49-F238E27FC236}">
-                <a16:creationId xmlns:a16="http://schemas.microsoft.com/office/drawing/2014/main" id="{C788446C-CFA3-357D-1F12-3EB4C7C7FE83}"/>
+                <a16:creationId xmlns:a16="http://schemas.microsoft.com/office/drawing/2014/main" id="{F8CAC1A5-5FF1-B7DB-ECB6-A13636F73A24}"/>
               </a:ext>
             </a:extLst>
           </p:cNvPr>
@@ -14258,13 +14121,14 @@
               </a:ext>
             </a:extLst>
           </a:blip>
-          <a:srcRect/>
-          <a:stretch/>
+          <a:stretch>
+            <a:fillRect/>
+          </a:stretch>
         </p:blipFill>
         <p:spPr>
           <a:xfrm>
-            <a:off x="266700" y="320040"/>
-            <a:ext cx="11658600" cy="6217920"/>
+            <a:off x="0" y="1803400"/>
+            <a:ext cx="12192000" cy="3251200"/>
           </a:xfrm>
           <a:prstGeom prst="rect">
             <a:avLst/>
@@ -16915,10 +16779,10 @@
       </p:grpSpPr>
       <p:pic>
         <p:nvPicPr>
-          <p:cNvPr id="3" name="Picture 2">
+          <p:cNvPr id="10" name="Picture 9" descr="A picture containing line, screenshot, plot, diagram&#10;&#10;Description automatically generated">
             <a:extLst>
               <a:ext uri="{FF2B5EF4-FFF2-40B4-BE49-F238E27FC236}">
-                <a16:creationId xmlns:a16="http://schemas.microsoft.com/office/drawing/2014/main" id="{77A2B690-E628-DF1B-A6E9-EBD05D597FC5}"/>
+                <a16:creationId xmlns:a16="http://schemas.microsoft.com/office/drawing/2014/main" id="{D9A2CAE1-04DB-091F-BE8E-7C7DFE69DF33}"/>
               </a:ext>
             </a:extLst>
           </p:cNvPr>
@@ -16935,13 +16799,50 @@
               </a:ext>
             </a:extLst>
           </a:blip>
-          <a:srcRect/>
-          <a:stretch/>
+          <a:stretch>
+            <a:fillRect/>
+          </a:stretch>
         </p:blipFill>
         <p:spPr>
           <a:xfrm>
-            <a:off x="266700" y="320039"/>
-            <a:ext cx="11658600" cy="6217920"/>
+            <a:off x="0" y="80926"/>
+            <a:ext cx="12192000" cy="3251200"/>
+          </a:xfrm>
+          <a:prstGeom prst="rect">
+            <a:avLst/>
+          </a:prstGeom>
+        </p:spPr>
+      </p:pic>
+      <p:pic>
+        <p:nvPicPr>
+          <p:cNvPr id="12" name="Picture 11" descr="A picture containing line, screenshot, plot, diagram&#10;&#10;Description automatically generated">
+            <a:extLst>
+              <a:ext uri="{FF2B5EF4-FFF2-40B4-BE49-F238E27FC236}">
+                <a16:creationId xmlns:a16="http://schemas.microsoft.com/office/drawing/2014/main" id="{A78653BF-8A64-AF5E-231D-4D3ABEB32D6B}"/>
+              </a:ext>
+            </a:extLst>
+          </p:cNvPr>
+          <p:cNvPicPr>
+            <a:picLocks noChangeAspect="1"/>
+          </p:cNvPicPr>
+          <p:nvPr/>
+        </p:nvPicPr>
+        <p:blipFill>
+          <a:blip r:embed="rId3">
+            <a:extLst>
+              <a:ext uri="{28A0092B-C50C-407E-A947-70E740481C1C}">
+                <a14:useLocalDpi xmlns:a14="http://schemas.microsoft.com/office/drawing/2010/main" val="0"/>
+              </a:ext>
+            </a:extLst>
+          </a:blip>
+          <a:stretch>
+            <a:fillRect/>
+          </a:stretch>
+        </p:blipFill>
+        <p:spPr>
+          <a:xfrm>
+            <a:off x="0" y="3606800"/>
+            <a:ext cx="12192000" cy="3251200"/>
           </a:xfrm>
           <a:prstGeom prst="rect">
             <a:avLst/>
@@ -16993,14 +16894,14 @@
           <p:nvPr>
             <p:extLst>
               <p:ext uri="{D42A27DB-BD31-4B8C-83A1-F6EECF244321}">
-                <p14:modId xmlns:p14="http://schemas.microsoft.com/office/powerpoint/2010/main" val="2514974042"/>
+                <p14:modId xmlns:p14="http://schemas.microsoft.com/office/powerpoint/2010/main" val="3458207368"/>
               </p:ext>
             </p:extLst>
           </p:nvPr>
         </p:nvGraphicFramePr>
         <p:xfrm>
-          <a:off x="0" y="1431063"/>
-          <a:ext cx="12192004" cy="4160520"/>
+          <a:off x="0" y="3525520"/>
+          <a:ext cx="12192004" cy="3332480"/>
         </p:xfrm>
         <a:graphic>
           <a:graphicData uri="http://schemas.openxmlformats.org/drawingml/2006/table">
@@ -17065,14 +16966,14 @@
                     </a:ext>
                   </a:extLst>
                 </a:gridCol>
-                <a:gridCol w="1286934">
+                <a:gridCol w="1100667">
                   <a:extLst>
                     <a:ext uri="{9D8B030D-6E8A-4147-A177-3AD203B41FA5}">
                       <a16:colId xmlns:a16="http://schemas.microsoft.com/office/drawing/2014/main" val="1970964562"/>
                     </a:ext>
                   </a:extLst>
                 </a:gridCol>
-                <a:gridCol w="1296173">
+                <a:gridCol w="1482440">
                   <a:extLst>
                     <a:ext uri="{9D8B030D-6E8A-4147-A177-3AD203B41FA5}">
                       <a16:colId xmlns:a16="http://schemas.microsoft.com/office/drawing/2014/main" val="4241872789"/>
@@ -17087,7 +16988,7 @@
                   </a:extLst>
                 </a:gridCol>
               </a:tblGrid>
-              <a:tr h="370840">
+              <a:tr h="198120">
                 <a:tc gridSpan="11">
                   <a:txBody>
                     <a:bodyPr/>
@@ -17095,7 +16996,7 @@
                     <a:p>
                       <a:pPr algn="l"/>
                       <a:r>
-                        <a:rPr lang="en-SG" sz="1600" dirty="0"/>
+                        <a:rPr lang="en-SG" sz="1400" dirty="0"/>
                         <a:t>Viscosity Standard 1275 – Best parameters according to volume pipetted experiment 2 updated with more trials</a:t>
                       </a:r>
                     </a:p>
@@ -17216,7 +17117,7 @@
                     <a:p>
                       <a:pPr algn="l"/>
                       <a:r>
-                        <a:rPr lang="en-SG" sz="1600" dirty="0"/>
+                        <a:rPr lang="en-SG" sz="1400" dirty="0"/>
                         <a:t>Volume</a:t>
                       </a:r>
                     </a:p>
@@ -17230,7 +17131,7 @@
                     <a:p>
                       <a:pPr algn="l"/>
                       <a:r>
-                        <a:rPr lang="en-SG" sz="1600" dirty="0"/>
+                        <a:rPr lang="en-SG" sz="1400" dirty="0"/>
                         <a:t>ML or Human</a:t>
                       </a:r>
                     </a:p>
@@ -17244,7 +17145,7 @@
                     <a:p>
                       <a:pPr algn="l"/>
                       <a:r>
-                        <a:rPr lang="en-SG" sz="1600" dirty="0"/>
+                        <a:rPr lang="en-SG" sz="1400" dirty="0"/>
                         <a:t>Aspiration Rate</a:t>
                       </a:r>
                     </a:p>
@@ -17258,7 +17159,7 @@
                     <a:p>
                       <a:pPr algn="l"/>
                       <a:r>
-                        <a:rPr lang="en-SG" sz="1600" dirty="0"/>
+                        <a:rPr lang="en-SG" sz="1400" dirty="0"/>
                         <a:t>Dispense Rate</a:t>
                       </a:r>
                     </a:p>
@@ -17272,7 +17173,7 @@
                     <a:p>
                       <a:pPr algn="l"/>
                       <a:r>
-                        <a:rPr lang="en-SG" sz="1600" dirty="0"/>
+                        <a:rPr lang="en-SG" sz="1400" dirty="0"/>
                         <a:t>Blow Out Rate</a:t>
                       </a:r>
                     </a:p>
@@ -17286,7 +17187,7 @@
                     <a:p>
                       <a:pPr algn="l"/>
                       <a:r>
-                        <a:rPr lang="en-SG" sz="1600" dirty="0"/>
+                        <a:rPr lang="en-SG" sz="1400" dirty="0"/>
                         <a:t>Delay Aspirate</a:t>
                       </a:r>
                     </a:p>
@@ -17300,7 +17201,7 @@
                     <a:p>
                       <a:pPr algn="l"/>
                       <a:r>
-                        <a:rPr lang="en-SG" sz="1600" dirty="0"/>
+                        <a:rPr lang="en-SG" sz="1400" dirty="0"/>
                         <a:t>Delay Dispense</a:t>
                       </a:r>
                     </a:p>
@@ -17314,7 +17215,7 @@
                     <a:p>
                       <a:pPr algn="l"/>
                       <a:r>
-                        <a:rPr lang="en-SG" sz="1600" dirty="0"/>
+                        <a:rPr lang="en-SG" sz="1400" dirty="0"/>
                         <a:t>Delay Blow Out</a:t>
                       </a:r>
                     </a:p>
@@ -17328,7 +17229,7 @@
                     <a:p>
                       <a:pPr algn="l"/>
                       <a:r>
-                        <a:rPr lang="en-SG" sz="1600" dirty="0"/>
+                        <a:rPr lang="en-SG" sz="1400" dirty="0"/>
                         <a:t>%error</a:t>
                       </a:r>
                     </a:p>
@@ -17342,26 +17243,26 @@
                     <a:p>
                       <a:pPr algn="l"/>
                       <a:r>
-                        <a:rPr lang="en-SG" sz="1600" dirty="0"/>
+                        <a:rPr lang="en-SG" sz="1400" dirty="0"/>
                         <a:t>Total Time for transfer 1000 </a:t>
                       </a:r>
                       <a:r>
-                        <a:rPr lang="en-SG" sz="1600" dirty="0" err="1"/>
+                        <a:rPr lang="en-SG" sz="1400" dirty="0" err="1"/>
                         <a:t>ul</a:t>
                       </a:r>
-                      <a:endParaRPr lang="en-SG" sz="1600" dirty="0"/>
-                    </a:p>
-                  </a:txBody>
-                  <a:tcPr/>
-                </a:tc>
-                <a:tc>
-                  <a:txBody>
-                    <a:bodyPr/>
-                    <a:lstStyle/>
-                    <a:p>
-                      <a:pPr algn="l"/>
-                      <a:r>
-                        <a:rPr lang="en-SG" sz="1600" dirty="0"/>
+                      <a:endParaRPr lang="en-SG" sz="1400" dirty="0"/>
+                    </a:p>
+                  </a:txBody>
+                  <a:tcPr/>
+                </a:tc>
+                <a:tc>
+                  <a:txBody>
+                    <a:bodyPr/>
+                    <a:lstStyle/>
+                    <a:p>
+                      <a:pPr algn="l"/>
+                      <a:r>
+                        <a:rPr lang="en-SG" sz="1400" dirty="0"/>
                         <a:t>Iteration</a:t>
                       </a:r>
                     </a:p>
@@ -17374,15 +17275,15 @@
                   </a:ext>
                 </a:extLst>
               </a:tr>
-              <a:tr h="370840">
-                <a:tc>
-                  <a:txBody>
-                    <a:bodyPr/>
-                    <a:lstStyle/>
-                    <a:p>
-                      <a:pPr algn="l"/>
-                      <a:r>
-                        <a:rPr lang="en-SG" sz="1600" dirty="0"/>
+              <a:tr h="299720">
+                <a:tc>
+                  <a:txBody>
+                    <a:bodyPr/>
+                    <a:lstStyle/>
+                    <a:p>
+                      <a:pPr algn="l"/>
+                      <a:r>
+                        <a:rPr lang="en-SG" sz="1400" dirty="0"/>
                         <a:t>300</a:t>
                       </a:r>
                     </a:p>
@@ -17400,7 +17301,7 @@
                     <a:p>
                       <a:pPr algn="l"/>
                       <a:r>
-                        <a:rPr lang="en-SG" sz="1600" dirty="0"/>
+                        <a:rPr lang="en-SG" sz="1400" dirty="0"/>
                         <a:t>ML</a:t>
                       </a:r>
                     </a:p>
@@ -17418,7 +17319,7 @@
                     <a:p>
                       <a:pPr algn="l"/>
                       <a:r>
-                        <a:rPr lang="en-SG" sz="1600" dirty="0"/>
+                        <a:rPr lang="en-SG" sz="1400" dirty="0"/>
                         <a:t>10.440661</a:t>
                       </a:r>
                     </a:p>
@@ -17436,7 +17337,7 @@
                     <a:p>
                       <a:pPr algn="l" fontAlgn="ctr"/>
                       <a:r>
-                        <a:rPr lang="en-SG" sz="1600" dirty="0">
+                        <a:rPr lang="en-SG" sz="1400" dirty="0">
                           <a:effectLst/>
                         </a:rPr>
                         <a:t>4.763605</a:t>
@@ -17456,7 +17357,7 @@
                     <a:p>
                       <a:pPr algn="l"/>
                       <a:r>
-                        <a:rPr lang="en-SG" sz="1600" dirty="0"/>
+                        <a:rPr lang="en-SG" sz="1400" dirty="0"/>
                         <a:t>0</a:t>
                       </a:r>
                     </a:p>
@@ -17474,7 +17375,7 @@
                     <a:p>
                       <a:pPr algn="l"/>
                       <a:r>
-                        <a:rPr lang="en-SG" sz="1600" dirty="0"/>
+                        <a:rPr lang="en-SG" sz="1400" dirty="0"/>
                         <a:t>5</a:t>
                       </a:r>
                     </a:p>
@@ -17492,7 +17393,7 @@
                     <a:p>
                       <a:pPr algn="l"/>
                       <a:r>
-                        <a:rPr lang="en-SG" sz="1600" dirty="0"/>
+                        <a:rPr lang="en-SG" sz="1400" dirty="0"/>
                         <a:t>5</a:t>
                       </a:r>
                     </a:p>
@@ -17510,7 +17411,7 @@
                     <a:p>
                       <a:pPr algn="l" fontAlgn="ctr"/>
                       <a:r>
-                        <a:rPr lang="en-SG" sz="1600" dirty="0">
+                        <a:rPr lang="en-SG" sz="1400" dirty="0">
                           <a:effectLst/>
                         </a:rPr>
                         <a:t>0</a:t>
@@ -17530,7 +17431,7 @@
                     <a:p>
                       <a:pPr algn="l" fontAlgn="ctr"/>
                       <a:r>
-                        <a:rPr lang="en-SG" sz="1600" dirty="0">
+                        <a:rPr lang="en-SG" sz="1400" dirty="0">
                           <a:effectLst/>
                         </a:rPr>
                         <a:t>-2.052808</a:t>
@@ -17550,7 +17451,7 @@
                     <a:p>
                       <a:pPr algn="l"/>
                       <a:r>
-                        <a:rPr lang="en-SG" sz="1600" dirty="0"/>
+                        <a:rPr lang="en-SG" sz="1400" dirty="0"/>
                         <a:t>315.704410</a:t>
                       </a:r>
                     </a:p>
@@ -17568,7 +17469,7 @@
                     <a:p>
                       <a:pPr algn="l"/>
                       <a:r>
-                        <a:rPr lang="en-SG" sz="1600" dirty="0"/>
+                        <a:rPr lang="en-SG" sz="1400" dirty="0"/>
                         <a:t>19</a:t>
                       </a:r>
                     </a:p>
@@ -17585,15 +17486,15 @@
                   </a:ext>
                 </a:extLst>
               </a:tr>
-              <a:tr h="370840">
-                <a:tc>
-                  <a:txBody>
-                    <a:bodyPr/>
-                    <a:lstStyle/>
-                    <a:p>
-                      <a:pPr algn="l"/>
-                      <a:r>
-                        <a:rPr lang="en-SG" sz="1600" dirty="0"/>
+              <a:tr h="297180">
+                <a:tc>
+                  <a:txBody>
+                    <a:bodyPr/>
+                    <a:lstStyle/>
+                    <a:p>
+                      <a:pPr algn="l"/>
+                      <a:r>
+                        <a:rPr lang="en-SG" sz="1400" dirty="0"/>
                         <a:t>300</a:t>
                       </a:r>
                     </a:p>
@@ -17607,7 +17508,7 @@
                     <a:p>
                       <a:pPr algn="l"/>
                       <a:r>
-                        <a:rPr lang="en-SG" sz="1600" dirty="0"/>
+                        <a:rPr lang="en-SG" sz="1400" dirty="0"/>
                         <a:t>Human</a:t>
                       </a:r>
                     </a:p>
@@ -17621,7 +17522,7 @@
                     <a:p>
                       <a:pPr algn="l"/>
                       <a:r>
-                        <a:rPr lang="en-SG" sz="1600" dirty="0"/>
+                        <a:rPr lang="en-SG" sz="1400" dirty="0"/>
                         <a:t>9</a:t>
                       </a:r>
                     </a:p>
@@ -17635,7 +17536,7 @@
                     <a:p>
                       <a:pPr algn="l"/>
                       <a:r>
-                        <a:rPr lang="en-SG" sz="1600" dirty="0"/>
+                        <a:rPr lang="en-SG" sz="1400" dirty="0"/>
                         <a:t>3</a:t>
                       </a:r>
                     </a:p>
@@ -17649,7 +17550,7 @@
                     <a:p>
                       <a:pPr algn="l"/>
                       <a:r>
-                        <a:rPr lang="en-SG" sz="1600" dirty="0"/>
+                        <a:rPr lang="en-SG" sz="1400" dirty="0"/>
                         <a:t>0</a:t>
                       </a:r>
                     </a:p>
@@ -17663,7 +17564,7 @@
                     <a:p>
                       <a:pPr algn="l"/>
                       <a:r>
-                        <a:rPr lang="en-SG" sz="1600" dirty="0"/>
+                        <a:rPr lang="en-SG" sz="1400" dirty="0"/>
                         <a:t>3</a:t>
                       </a:r>
                     </a:p>
@@ -17677,7 +17578,7 @@
                     <a:p>
                       <a:pPr algn="l"/>
                       <a:r>
-                        <a:rPr lang="en-SG" sz="1600" dirty="0"/>
+                        <a:rPr lang="en-SG" sz="1400" dirty="0"/>
                         <a:t>3</a:t>
                       </a:r>
                     </a:p>
@@ -17691,7 +17592,7 @@
                     <a:p>
                       <a:pPr algn="l"/>
                       <a:r>
-                        <a:rPr lang="en-SG" sz="1600" dirty="0"/>
+                        <a:rPr lang="en-SG" sz="1400" dirty="0"/>
                         <a:t>0</a:t>
                       </a:r>
                     </a:p>
@@ -17705,7 +17606,7 @@
                     <a:p>
                       <a:pPr algn="l"/>
                       <a:r>
-                        <a:rPr lang="en-SG" sz="1600" dirty="0"/>
+                        <a:rPr lang="en-SG" sz="1400" dirty="0"/>
                         <a:t>-2.205433</a:t>
                       </a:r>
                     </a:p>
@@ -17719,7 +17620,7 @@
                     <a:p>
                       <a:pPr algn="l"/>
                       <a:r>
-                        <a:rPr lang="en-SG" sz="1600" dirty="0"/>
+                        <a:rPr lang="en-SG" sz="1400" dirty="0"/>
                         <a:t>450.444444</a:t>
                       </a:r>
                     </a:p>
@@ -17733,7 +17634,7 @@
                     <a:p>
                       <a:pPr algn="l"/>
                       <a:r>
-                        <a:rPr lang="en-SG" sz="1600" dirty="0"/>
+                        <a:rPr lang="en-SG" sz="1400" dirty="0"/>
                         <a:t>12</a:t>
                       </a:r>
                     </a:p>
@@ -17754,7 +17655,7 @@
                     <a:p>
                       <a:pPr algn="l"/>
                       <a:r>
-                        <a:rPr lang="en-SG" sz="1600" dirty="0"/>
+                        <a:rPr lang="en-SG" sz="1400" dirty="0"/>
                         <a:t>500</a:t>
                       </a:r>
                     </a:p>
@@ -17772,7 +17673,7 @@
                     <a:p>
                       <a:pPr algn="l"/>
                       <a:r>
-                        <a:rPr lang="en-SG" sz="1600" dirty="0"/>
+                        <a:rPr lang="en-SG" sz="1400" dirty="0"/>
                         <a:t>ML</a:t>
                       </a:r>
                     </a:p>
@@ -17790,7 +17691,7 @@
                     <a:p>
                       <a:pPr algn="l"/>
                       <a:r>
-                        <a:rPr lang="en-SG" sz="1600" dirty="0"/>
+                        <a:rPr lang="en-SG" sz="1400" dirty="0"/>
                         <a:t>12.501784</a:t>
                       </a:r>
                     </a:p>
@@ -17808,7 +17709,7 @@
                     <a:p>
                       <a:pPr algn="l"/>
                       <a:r>
-                        <a:rPr lang="en-SG" sz="1600" dirty="0"/>
+                        <a:rPr lang="en-SG" sz="1400" dirty="0"/>
                         <a:t>5.478683</a:t>
                       </a:r>
                     </a:p>
@@ -17826,7 +17727,7 @@
                     <a:p>
                       <a:pPr algn="l"/>
                       <a:r>
-                        <a:rPr lang="en-SG" sz="1600" dirty="0"/>
+                        <a:rPr lang="en-SG" sz="1400" dirty="0"/>
                         <a:t>0</a:t>
                       </a:r>
                     </a:p>
@@ -17844,7 +17745,7 @@
                     <a:p>
                       <a:pPr algn="l"/>
                       <a:r>
-                        <a:rPr lang="en-SG" sz="1600" dirty="0"/>
+                        <a:rPr lang="en-SG" sz="1400" dirty="0"/>
                         <a:t>5</a:t>
                       </a:r>
                     </a:p>
@@ -17862,7 +17763,7 @@
                     <a:p>
                       <a:pPr algn="l"/>
                       <a:r>
-                        <a:rPr lang="en-SG" sz="1600" dirty="0"/>
+                        <a:rPr lang="en-SG" sz="1400" dirty="0"/>
                         <a:t>5</a:t>
                       </a:r>
                     </a:p>
@@ -17880,7 +17781,7 @@
                     <a:p>
                       <a:pPr algn="l"/>
                       <a:r>
-                        <a:rPr lang="en-SG" sz="1600" dirty="0"/>
+                        <a:rPr lang="en-SG" sz="1400" dirty="0"/>
                         <a:t>0</a:t>
                       </a:r>
                     </a:p>
@@ -17898,7 +17799,7 @@
                     <a:p>
                       <a:pPr algn="l"/>
                       <a:r>
-                        <a:rPr lang="en-SG" sz="1600" dirty="0"/>
+                        <a:rPr lang="en-SG" sz="1400" dirty="0"/>
                         <a:t>-1.602564	</a:t>
                       </a:r>
                     </a:p>
@@ -17916,7 +17817,7 @@
                     <a:p>
                       <a:pPr algn="l"/>
                       <a:r>
-                        <a:rPr lang="en-SG" sz="1600" dirty="0"/>
+                        <a:rPr lang="en-SG" sz="1400" dirty="0"/>
                         <a:t>272.514202</a:t>
                       </a:r>
                     </a:p>
@@ -17934,7 +17835,7 @@
                     <a:p>
                       <a:pPr algn="l"/>
                       <a:r>
-                        <a:rPr lang="en-SG" sz="1600" dirty="0"/>
+                        <a:rPr lang="en-SG" sz="1400" dirty="0"/>
                         <a:t>7</a:t>
                       </a:r>
                     </a:p>
@@ -17951,15 +17852,15 @@
                   </a:ext>
                 </a:extLst>
               </a:tr>
-              <a:tr h="370840">
-                <a:tc>
-                  <a:txBody>
-                    <a:bodyPr/>
-                    <a:lstStyle/>
-                    <a:p>
-                      <a:pPr algn="l"/>
-                      <a:r>
-                        <a:rPr lang="en-SG" sz="1600" dirty="0"/>
+              <a:tr h="279400">
+                <a:tc>
+                  <a:txBody>
+                    <a:bodyPr/>
+                    <a:lstStyle/>
+                    <a:p>
+                      <a:pPr algn="l"/>
+                      <a:r>
+                        <a:rPr lang="en-SG" sz="1400" dirty="0"/>
                         <a:t>500</a:t>
                       </a:r>
                     </a:p>
@@ -17977,7 +17878,7 @@
                     <a:p>
                       <a:pPr algn="l"/>
                       <a:r>
-                        <a:rPr lang="en-SG" sz="1600" dirty="0"/>
+                        <a:rPr lang="en-SG" sz="1400" dirty="0"/>
                         <a:t>ML</a:t>
                       </a:r>
                     </a:p>
@@ -17995,7 +17896,7 @@
                     <a:p>
                       <a:pPr algn="l"/>
                       <a:r>
-                        <a:rPr lang="en-SG" sz="1600" dirty="0"/>
+                        <a:rPr lang="en-SG" sz="1400" dirty="0"/>
                         <a:t>10.869956</a:t>
                       </a:r>
                     </a:p>
@@ -18013,7 +17914,7 @@
                     <a:p>
                       <a:pPr algn="l"/>
                       <a:r>
-                        <a:rPr lang="en-SG" sz="1600" dirty="0"/>
+                        <a:rPr lang="en-SG" sz="1400" dirty="0"/>
                         <a:t>5.063828</a:t>
                       </a:r>
                     </a:p>
@@ -18031,7 +17932,7 @@
                     <a:p>
                       <a:pPr algn="l"/>
                       <a:r>
-                        <a:rPr lang="en-SG" sz="1600" dirty="0"/>
+                        <a:rPr lang="en-SG" sz="1400" dirty="0"/>
                         <a:t>0</a:t>
                       </a:r>
                     </a:p>
@@ -18049,7 +17950,7 @@
                     <a:p>
                       <a:pPr algn="l"/>
                       <a:r>
-                        <a:rPr lang="en-SG" sz="1600" dirty="0"/>
+                        <a:rPr lang="en-SG" sz="1400" dirty="0"/>
                         <a:t>5</a:t>
                       </a:r>
                     </a:p>
@@ -18067,7 +17968,7 @@
                     <a:p>
                       <a:pPr algn="l"/>
                       <a:r>
-                        <a:rPr lang="en-SG" sz="1600" dirty="0"/>
+                        <a:rPr lang="en-SG" sz="1400" dirty="0"/>
                         <a:t>5</a:t>
                       </a:r>
                     </a:p>
@@ -18085,7 +17986,7 @@
                     <a:p>
                       <a:pPr algn="l"/>
                       <a:r>
-                        <a:rPr lang="en-SG" sz="1600" dirty="0"/>
+                        <a:rPr lang="en-SG" sz="1400" dirty="0"/>
                         <a:t>0</a:t>
                       </a:r>
                     </a:p>
@@ -18103,7 +18004,7 @@
                     <a:p>
                       <a:pPr algn="l"/>
                       <a:r>
-                        <a:rPr lang="en-SG" sz="1600" dirty="0"/>
+                        <a:rPr lang="en-SG" sz="1400" dirty="0"/>
                         <a:t>-0.663919</a:t>
                       </a:r>
                     </a:p>
@@ -18121,7 +18022,7 @@
                     <a:p>
                       <a:pPr algn="l"/>
                       <a:r>
-                        <a:rPr lang="en-SG" sz="1600" dirty="0"/>
+                        <a:rPr lang="en-SG" sz="1400" dirty="0"/>
                         <a:t>299.475744</a:t>
                       </a:r>
                     </a:p>
@@ -18139,7 +18040,7 @@
                     <a:p>
                       <a:pPr algn="l"/>
                       <a:r>
-                        <a:rPr lang="en-SG" sz="1600" dirty="0"/>
+                        <a:rPr lang="en-SG" sz="1400" dirty="0"/>
                         <a:t>10</a:t>
                       </a:r>
                     </a:p>
@@ -18156,15 +18057,15 @@
                   </a:ext>
                 </a:extLst>
               </a:tr>
-              <a:tr h="370840">
-                <a:tc>
-                  <a:txBody>
-                    <a:bodyPr/>
-                    <a:lstStyle/>
-                    <a:p>
-                      <a:pPr algn="l"/>
-                      <a:r>
-                        <a:rPr lang="en-SG" sz="1600" dirty="0"/>
+              <a:tr h="289560">
+                <a:tc>
+                  <a:txBody>
+                    <a:bodyPr/>
+                    <a:lstStyle/>
+                    <a:p>
+                      <a:pPr algn="l"/>
+                      <a:r>
+                        <a:rPr lang="en-SG" sz="1400" dirty="0"/>
                         <a:t>500</a:t>
                       </a:r>
                     </a:p>
@@ -18178,7 +18079,7 @@
                     <a:p>
                       <a:pPr algn="l"/>
                       <a:r>
-                        <a:rPr lang="en-SG" sz="1600" dirty="0"/>
+                        <a:rPr lang="en-SG" sz="1400" dirty="0"/>
                         <a:t>Human</a:t>
                       </a:r>
                     </a:p>
@@ -18192,7 +18093,7 @@
                     <a:p>
                       <a:pPr algn="l"/>
                       <a:r>
-                        <a:rPr lang="en-SG" sz="1600" dirty="0"/>
+                        <a:rPr lang="en-SG" sz="1400" dirty="0"/>
                         <a:t>9</a:t>
                       </a:r>
                     </a:p>
@@ -18206,7 +18107,7 @@
                     <a:p>
                       <a:pPr algn="l"/>
                       <a:r>
-                        <a:rPr lang="en-SG" sz="1600" dirty="0"/>
+                        <a:rPr lang="en-SG" sz="1400" dirty="0"/>
                         <a:t>3</a:t>
                       </a:r>
                     </a:p>
@@ -18220,7 +18121,7 @@
                     <a:p>
                       <a:pPr algn="l"/>
                       <a:r>
-                        <a:rPr lang="en-SG" sz="1600" dirty="0"/>
+                        <a:rPr lang="en-SG" sz="1400" dirty="0"/>
                         <a:t>0</a:t>
                       </a:r>
                     </a:p>
@@ -18234,7 +18135,7 @@
                     <a:p>
                       <a:pPr algn="l"/>
                       <a:r>
-                        <a:rPr lang="en-SG" sz="1600" dirty="0"/>
+                        <a:rPr lang="en-SG" sz="1400" dirty="0"/>
                         <a:t>3</a:t>
                       </a:r>
                     </a:p>
@@ -18248,7 +18149,7 @@
                     <a:p>
                       <a:pPr algn="l"/>
                       <a:r>
-                        <a:rPr lang="en-SG" sz="1600" dirty="0"/>
+                        <a:rPr lang="en-SG" sz="1400" dirty="0"/>
                         <a:t>3</a:t>
                       </a:r>
                     </a:p>
@@ -18262,7 +18163,7 @@
                     <a:p>
                       <a:pPr algn="l"/>
                       <a:r>
-                        <a:rPr lang="en-SG" sz="1600" dirty="0"/>
+                        <a:rPr lang="en-SG" sz="1400" dirty="0"/>
                         <a:t>0</a:t>
                       </a:r>
                     </a:p>
@@ -18276,7 +18177,7 @@
                     <a:p>
                       <a:pPr algn="l"/>
                       <a:r>
-                        <a:rPr lang="en-SG" sz="1600" dirty="0"/>
+                        <a:rPr lang="en-SG" sz="1400" dirty="0"/>
                         <a:t>-2.930403</a:t>
                       </a:r>
                     </a:p>
@@ -18290,7 +18191,7 @@
                     <a:p>
                       <a:pPr algn="l"/>
                       <a:r>
-                        <a:rPr lang="en-SG" sz="1600" dirty="0"/>
+                        <a:rPr lang="en-SG" sz="1400" dirty="0"/>
                         <a:t>450.444444</a:t>
                       </a:r>
                     </a:p>
@@ -18304,7 +18205,7 @@
                     <a:p>
                       <a:pPr algn="l"/>
                       <a:r>
-                        <a:rPr lang="en-SG" sz="1600" dirty="0"/>
+                        <a:rPr lang="en-SG" sz="1400" dirty="0"/>
                         <a:t>12</a:t>
                       </a:r>
                     </a:p>
@@ -18317,15 +18218,15 @@
                   </a:ext>
                 </a:extLst>
               </a:tr>
-              <a:tr h="370840">
-                <a:tc>
-                  <a:txBody>
-                    <a:bodyPr/>
-                    <a:lstStyle/>
-                    <a:p>
-                      <a:pPr algn="l"/>
-                      <a:r>
-                        <a:rPr lang="en-SG" sz="1600" dirty="0"/>
+              <a:tr h="287020">
+                <a:tc>
+                  <a:txBody>
+                    <a:bodyPr/>
+                    <a:lstStyle/>
+                    <a:p>
+                      <a:pPr algn="l"/>
+                      <a:r>
+                        <a:rPr lang="en-SG" sz="1400" dirty="0"/>
                         <a:t>1000</a:t>
                       </a:r>
                     </a:p>
@@ -18343,7 +18244,7 @@
                     <a:p>
                       <a:pPr algn="l"/>
                       <a:r>
-                        <a:rPr lang="en-SG" sz="1600" dirty="0"/>
+                        <a:rPr lang="en-SG" sz="1400" dirty="0"/>
                         <a:t>ML</a:t>
                       </a:r>
                     </a:p>
@@ -18361,7 +18262,7 @@
                     <a:p>
                       <a:pPr algn="l"/>
                       <a:r>
-                        <a:rPr lang="en-SG" sz="1600" dirty="0"/>
+                        <a:rPr lang="en-SG" sz="1400" dirty="0"/>
                         <a:t>7.477992</a:t>
                       </a:r>
                     </a:p>
@@ -18379,7 +18280,7 @@
                     <a:p>
                       <a:pPr algn="l"/>
                       <a:r>
-                        <a:rPr lang="en-SG" sz="1600" dirty="0"/>
+                        <a:rPr lang="en-SG" sz="1400" dirty="0"/>
                         <a:t>9.550622</a:t>
                       </a:r>
                     </a:p>
@@ -18397,7 +18298,7 @@
                     <a:p>
                       <a:pPr algn="l"/>
                       <a:r>
-                        <a:rPr lang="en-SG" sz="1600" dirty="0"/>
+                        <a:rPr lang="en-SG" sz="1400" dirty="0"/>
                         <a:t>0</a:t>
                       </a:r>
                     </a:p>
@@ -18415,7 +18316,7 @@
                     <a:p>
                       <a:pPr algn="l"/>
                       <a:r>
-                        <a:rPr lang="en-SG" sz="1600" dirty="0"/>
+                        <a:rPr lang="en-SG" sz="1400" dirty="0"/>
                         <a:t>5</a:t>
                       </a:r>
                     </a:p>
@@ -18433,7 +18334,7 @@
                     <a:p>
                       <a:pPr algn="l"/>
                       <a:r>
-                        <a:rPr lang="en-SG" sz="1600" dirty="0"/>
+                        <a:rPr lang="en-SG" sz="1400" dirty="0"/>
                         <a:t>5</a:t>
                       </a:r>
                     </a:p>
@@ -18451,7 +18352,7 @@
                     <a:p>
                       <a:pPr algn="l"/>
                       <a:r>
-                        <a:rPr lang="en-SG" sz="1600" dirty="0"/>
+                        <a:rPr lang="en-SG" sz="1400" dirty="0"/>
                         <a:t>0</a:t>
                       </a:r>
                     </a:p>
@@ -18469,7 +18370,7 @@
                     <a:p>
                       <a:pPr algn="l"/>
                       <a:r>
-                        <a:rPr lang="en-SG" sz="1600" dirty="0"/>
+                        <a:rPr lang="en-SG" sz="1400" dirty="0"/>
                         <a:t>-1.488095</a:t>
                       </a:r>
                     </a:p>
@@ -18487,7 +18388,7 @@
                     <a:p>
                       <a:pPr algn="l"/>
                       <a:r>
-                        <a:rPr lang="en-SG" sz="1600" dirty="0"/>
+                        <a:rPr lang="en-SG" sz="1400" dirty="0"/>
                         <a:t>248.430956</a:t>
                       </a:r>
                     </a:p>
@@ -18505,7 +18406,7 @@
                     <a:p>
                       <a:pPr algn="l"/>
                       <a:r>
-                        <a:rPr lang="en-SG" sz="1600" dirty="0"/>
+                        <a:rPr lang="en-SG" sz="1400" dirty="0"/>
                         <a:t>9</a:t>
                       </a:r>
                     </a:p>
@@ -18522,15 +18423,15 @@
                   </a:ext>
                 </a:extLst>
               </a:tr>
-              <a:tr h="370840">
-                <a:tc>
-                  <a:txBody>
-                    <a:bodyPr/>
-                    <a:lstStyle/>
-                    <a:p>
-                      <a:pPr algn="l"/>
-                      <a:r>
-                        <a:rPr lang="en-SG" sz="1600" dirty="0"/>
+              <a:tr h="309880">
+                <a:tc>
+                  <a:txBody>
+                    <a:bodyPr/>
+                    <a:lstStyle/>
+                    <a:p>
+                      <a:pPr algn="l"/>
+                      <a:r>
+                        <a:rPr lang="en-SG" sz="1400" dirty="0"/>
                         <a:t>1000</a:t>
                       </a:r>
                     </a:p>
@@ -18548,7 +18449,7 @@
                     <a:p>
                       <a:pPr algn="l"/>
                       <a:r>
-                        <a:rPr lang="en-SG" sz="1600" dirty="0"/>
+                        <a:rPr lang="en-SG" sz="1400" dirty="0"/>
                         <a:t>ML</a:t>
                       </a:r>
                     </a:p>
@@ -18566,7 +18467,7 @@
                     <a:p>
                       <a:pPr algn="l"/>
                       <a:r>
-                        <a:rPr lang="en-SG" sz="1600" dirty="0"/>
+                        <a:rPr lang="en-SG" sz="1400" dirty="0"/>
                         <a:t>5.214088</a:t>
                       </a:r>
                     </a:p>
@@ -18584,7 +18485,7 @@
                     <a:p>
                       <a:pPr algn="l"/>
                       <a:r>
-                        <a:rPr lang="en-SG" sz="1600" dirty="0"/>
+                        <a:rPr lang="en-SG" sz="1400" dirty="0"/>
                         <a:t>11.489550	</a:t>
                       </a:r>
                     </a:p>
@@ -18602,7 +18503,7 @@
                     <a:p>
                       <a:pPr algn="l"/>
                       <a:r>
-                        <a:rPr lang="en-SG" sz="1600" dirty="0"/>
+                        <a:rPr lang="en-SG" sz="1400" dirty="0"/>
                         <a:t>0</a:t>
                       </a:r>
                     </a:p>
@@ -18620,7 +18521,7 @@
                     <a:p>
                       <a:pPr algn="l"/>
                       <a:r>
-                        <a:rPr lang="en-SG" sz="1600" dirty="0"/>
+                        <a:rPr lang="en-SG" sz="1400" dirty="0"/>
                         <a:t>5</a:t>
                       </a:r>
                     </a:p>
@@ -18638,7 +18539,7 @@
                     <a:p>
                       <a:pPr algn="l"/>
                       <a:r>
-                        <a:rPr lang="en-SG" sz="1600" dirty="0"/>
+                        <a:rPr lang="en-SG" sz="1400" dirty="0"/>
                         <a:t>5</a:t>
                       </a:r>
                     </a:p>
@@ -18656,7 +18557,7 @@
                     <a:p>
                       <a:pPr algn="l"/>
                       <a:r>
-                        <a:rPr lang="en-SG" sz="1600" dirty="0"/>
+                        <a:rPr lang="en-SG" sz="1400" dirty="0"/>
                         <a:t>0</a:t>
                       </a:r>
                     </a:p>
@@ -18674,7 +18575,7 @@
                     <a:p>
                       <a:pPr algn="l"/>
                       <a:r>
-                        <a:rPr lang="en-SG" sz="1600" dirty="0"/>
+                        <a:rPr lang="en-SG" sz="1400" dirty="0"/>
                         <a:t>-0.812729</a:t>
                       </a:r>
                     </a:p>
@@ -18708,7 +18609,7 @@
                         <a:defRPr/>
                       </a:pPr>
                       <a:r>
-                        <a:rPr lang="en-SG" sz="1600" dirty="0"/>
+                        <a:rPr lang="en-SG" sz="1400" dirty="0"/>
                         <a:t>288.823716</a:t>
                       </a:r>
                     </a:p>
@@ -18726,7 +18627,7 @@
                     <a:p>
                       <a:pPr algn="l"/>
                       <a:r>
-                        <a:rPr lang="en-SG" sz="1600" dirty="0"/>
+                        <a:rPr lang="en-SG" sz="1400" dirty="0"/>
                         <a:t>13</a:t>
                       </a:r>
                     </a:p>
@@ -18743,15 +18644,15 @@
                   </a:ext>
                 </a:extLst>
               </a:tr>
-              <a:tr h="370840">
-                <a:tc>
-                  <a:txBody>
-                    <a:bodyPr/>
-                    <a:lstStyle/>
-                    <a:p>
-                      <a:pPr algn="l"/>
-                      <a:r>
-                        <a:rPr lang="en-SG" sz="1600" dirty="0"/>
+              <a:tr h="256540">
+                <a:tc>
+                  <a:txBody>
+                    <a:bodyPr/>
+                    <a:lstStyle/>
+                    <a:p>
+                      <a:pPr algn="l"/>
+                      <a:r>
+                        <a:rPr lang="en-SG" sz="1400" dirty="0"/>
                         <a:t>1000</a:t>
                       </a:r>
                     </a:p>
@@ -18769,7 +18670,7 @@
                     <a:p>
                       <a:pPr algn="l"/>
                       <a:r>
-                        <a:rPr lang="en-SG" sz="1600" dirty="0"/>
+                        <a:rPr lang="en-SG" sz="1400" dirty="0"/>
                         <a:t>Human</a:t>
                       </a:r>
                     </a:p>
@@ -18787,7 +18688,7 @@
                     <a:p>
                       <a:pPr algn="l"/>
                       <a:r>
-                        <a:rPr lang="en-SG" sz="1600" dirty="0"/>
+                        <a:rPr lang="en-SG" sz="1400" dirty="0"/>
                         <a:t>9</a:t>
                       </a:r>
                     </a:p>
@@ -18805,7 +18706,7 @@
                     <a:p>
                       <a:pPr algn="l"/>
                       <a:r>
-                        <a:rPr lang="en-SG" sz="1600" dirty="0"/>
+                        <a:rPr lang="en-SG" sz="1400" dirty="0"/>
                         <a:t>3</a:t>
                       </a:r>
                     </a:p>
@@ -18823,7 +18724,7 @@
                     <a:p>
                       <a:pPr algn="l"/>
                       <a:r>
-                        <a:rPr lang="en-SG" sz="1600" dirty="0"/>
+                        <a:rPr lang="en-SG" sz="1400" dirty="0"/>
                         <a:t>0</a:t>
                       </a:r>
                     </a:p>
@@ -18841,7 +18742,7 @@
                     <a:p>
                       <a:pPr algn="l"/>
                       <a:r>
-                        <a:rPr lang="en-SG" sz="1600" dirty="0"/>
+                        <a:rPr lang="en-SG" sz="1400" dirty="0"/>
                         <a:t>3</a:t>
                       </a:r>
                     </a:p>
@@ -18859,7 +18760,7 @@
                     <a:p>
                       <a:pPr algn="l"/>
                       <a:r>
-                        <a:rPr lang="en-SG" sz="1600" dirty="0"/>
+                        <a:rPr lang="en-SG" sz="1400" dirty="0"/>
                         <a:t>3</a:t>
                       </a:r>
                     </a:p>
@@ -18877,7 +18778,7 @@
                     <a:p>
                       <a:pPr algn="l"/>
                       <a:r>
-                        <a:rPr lang="en-SG" sz="1600" dirty="0"/>
+                        <a:rPr lang="en-SG" sz="1400" dirty="0"/>
                         <a:t>0</a:t>
                       </a:r>
                     </a:p>
@@ -18895,7 +18796,7 @@
                     <a:p>
                       <a:pPr algn="l"/>
                       <a:r>
-                        <a:rPr lang="en-SG" sz="1600" dirty="0"/>
+                        <a:rPr lang="en-SG" sz="1400" dirty="0"/>
                         <a:t>-1.568223</a:t>
                       </a:r>
                     </a:p>
@@ -18929,7 +18830,7 @@
                         <a:defRPr/>
                       </a:pPr>
                       <a:r>
-                        <a:rPr lang="en-SG" sz="1600" dirty="0"/>
+                        <a:rPr lang="en-SG" sz="1400" dirty="0"/>
                         <a:t>450.444444</a:t>
                       </a:r>
                     </a:p>
@@ -18947,7 +18848,7 @@
                     <a:p>
                       <a:pPr algn="l"/>
                       <a:r>
-                        <a:rPr lang="en-SG" sz="1600" dirty="0"/>
+                        <a:rPr lang="en-SG" sz="1400" dirty="0"/>
                         <a:t>12</a:t>
                       </a:r>
                     </a:p>
@@ -18982,7 +18883,7 @@
         </p:nvSpPr>
         <p:spPr>
           <a:xfrm>
-            <a:off x="1786466" y="575733"/>
+            <a:off x="1786466" y="3125367"/>
             <a:ext cx="8619067" cy="369332"/>
           </a:xfrm>
           <a:prstGeom prst="rect">
@@ -19055,6 +18956,41 @@
           </p:pic>
         </mc:Fallback>
       </mc:AlternateContent>
+      <p:pic>
+        <p:nvPicPr>
+          <p:cNvPr id="7" name="Picture 6" descr="A picture containing line, diagram, plot, text&#10;&#10;Description automatically generated">
+            <a:extLst>
+              <a:ext uri="{FF2B5EF4-FFF2-40B4-BE49-F238E27FC236}">
+                <a16:creationId xmlns:a16="http://schemas.microsoft.com/office/drawing/2014/main" id="{67C6816D-B0AE-9572-C79E-273B42E7B8CE}"/>
+              </a:ext>
+            </a:extLst>
+          </p:cNvPr>
+          <p:cNvPicPr>
+            <a:picLocks noChangeAspect="1"/>
+          </p:cNvPicPr>
+          <p:nvPr/>
+        </p:nvPicPr>
+        <p:blipFill rotWithShape="1">
+          <a:blip r:embed="rId4">
+            <a:extLst>
+              <a:ext uri="{28A0092B-C50C-407E-A947-70E740481C1C}">
+                <a14:useLocalDpi xmlns:a14="http://schemas.microsoft.com/office/drawing/2010/main" val="0"/>
+              </a:ext>
+            </a:extLst>
+          </a:blip>
+          <a:srcRect b="3002"/>
+          <a:stretch/>
+        </p:blipFill>
+        <p:spPr>
+          <a:xfrm>
+            <a:off x="0" y="0"/>
+            <a:ext cx="12192000" cy="3153600"/>
+          </a:xfrm>
+          <a:prstGeom prst="rect">
+            <a:avLst/>
+          </a:prstGeom>
+        </p:spPr>
+      </p:pic>
     </p:spTree>
     <p:extLst>
       <p:ext uri="{BB962C8B-B14F-4D97-AF65-F5344CB8AC3E}">
@@ -19087,10 +19023,10 @@
       </p:grpSpPr>
       <p:pic>
         <p:nvPicPr>
-          <p:cNvPr id="3" name="Picture 2">
+          <p:cNvPr id="6" name="Picture 5" descr="A picture containing text, line, diagram, plot&#10;&#10;Description automatically generated">
             <a:extLst>
               <a:ext uri="{FF2B5EF4-FFF2-40B4-BE49-F238E27FC236}">
-                <a16:creationId xmlns:a16="http://schemas.microsoft.com/office/drawing/2014/main" id="{77A2B690-E628-DF1B-A6E9-EBD05D597FC5}"/>
+                <a16:creationId xmlns:a16="http://schemas.microsoft.com/office/drawing/2014/main" id="{798B439A-64C7-6781-496C-717745FFCE3B}"/>
               </a:ext>
             </a:extLst>
           </p:cNvPr>
@@ -19107,13 +19043,14 @@
               </a:ext>
             </a:extLst>
           </a:blip>
-          <a:srcRect/>
-          <a:stretch/>
+          <a:stretch>
+            <a:fillRect/>
+          </a:stretch>
         </p:blipFill>
         <p:spPr>
           <a:xfrm>
-            <a:off x="266701" y="320040"/>
-            <a:ext cx="11658598" cy="6217919"/>
+            <a:off x="0" y="1803400"/>
+            <a:ext cx="12192000" cy="3251200"/>
           </a:xfrm>
           <a:prstGeom prst="rect">
             <a:avLst/>
@@ -24999,10 +24936,10 @@
       </p:grpSpPr>
       <p:pic>
         <p:nvPicPr>
-          <p:cNvPr id="3" name="Picture 2">
+          <p:cNvPr id="4" name="Picture 3" descr="A picture containing line, text, diagram, plot&#10;&#10;Description automatically generated">
             <a:extLst>
               <a:ext uri="{FF2B5EF4-FFF2-40B4-BE49-F238E27FC236}">
-                <a16:creationId xmlns:a16="http://schemas.microsoft.com/office/drawing/2014/main" id="{4D455D8F-3CE0-A86E-2D51-897DBDDF3079}"/>
+                <a16:creationId xmlns:a16="http://schemas.microsoft.com/office/drawing/2014/main" id="{A34272DC-6D34-7518-6D0B-2CA5D98457D7}"/>
               </a:ext>
             </a:extLst>
           </p:cNvPr>
@@ -25019,13 +24956,50 @@
               </a:ext>
             </a:extLst>
           </a:blip>
-          <a:srcRect/>
-          <a:stretch/>
+          <a:stretch>
+            <a:fillRect/>
+          </a:stretch>
         </p:blipFill>
         <p:spPr>
           <a:xfrm>
-            <a:off x="266701" y="320040"/>
-            <a:ext cx="11658598" cy="6217919"/>
+            <a:off x="0" y="177800"/>
+            <a:ext cx="12192000" cy="3251200"/>
+          </a:xfrm>
+          <a:prstGeom prst="rect">
+            <a:avLst/>
+          </a:prstGeom>
+        </p:spPr>
+      </p:pic>
+      <p:pic>
+        <p:nvPicPr>
+          <p:cNvPr id="6" name="Picture 5" descr="A picture containing line, plot, diagram, screenshot&#10;&#10;Description automatically generated">
+            <a:extLst>
+              <a:ext uri="{FF2B5EF4-FFF2-40B4-BE49-F238E27FC236}">
+                <a16:creationId xmlns:a16="http://schemas.microsoft.com/office/drawing/2014/main" id="{46B9DA5D-B48A-19CA-9AC6-D1DD280D9B46}"/>
+              </a:ext>
+            </a:extLst>
+          </p:cNvPr>
+          <p:cNvPicPr>
+            <a:picLocks noChangeAspect="1"/>
+          </p:cNvPicPr>
+          <p:nvPr/>
+        </p:nvPicPr>
+        <p:blipFill>
+          <a:blip r:embed="rId3">
+            <a:extLst>
+              <a:ext uri="{28A0092B-C50C-407E-A947-70E740481C1C}">
+                <a14:useLocalDpi xmlns:a14="http://schemas.microsoft.com/office/drawing/2010/main" val="0"/>
+              </a:ext>
+            </a:extLst>
+          </a:blip>
+          <a:stretch>
+            <a:fillRect/>
+          </a:stretch>
+        </p:blipFill>
+        <p:spPr>
+          <a:xfrm>
+            <a:off x="0" y="3429000"/>
+            <a:ext cx="12192000" cy="3251200"/>
           </a:xfrm>
           <a:prstGeom prst="rect">
             <a:avLst/>
@@ -25077,13 +25051,13 @@
           <p:nvPr>
             <p:extLst>
               <p:ext uri="{D42A27DB-BD31-4B8C-83A1-F6EECF244321}">
-                <p14:modId xmlns:p14="http://schemas.microsoft.com/office/powerpoint/2010/main" val="1648693874"/>
+                <p14:modId xmlns:p14="http://schemas.microsoft.com/office/powerpoint/2010/main" val="299227717"/>
               </p:ext>
             </p:extLst>
           </p:nvPr>
         </p:nvGraphicFramePr>
         <p:xfrm>
-          <a:off x="0" y="1431063"/>
+          <a:off x="0" y="2697480"/>
           <a:ext cx="12192004" cy="4160520"/>
         </p:xfrm>
         <a:graphic>
@@ -26944,42 +26918,41 @@
           </a:graphicData>
         </a:graphic>
       </p:graphicFrame>
-      <p:sp>
-        <p:nvSpPr>
-          <p:cNvPr id="3" name="TextBox 2">
+      <p:pic>
+        <p:nvPicPr>
+          <p:cNvPr id="4" name="Picture 3" descr="A picture containing line, plot, screenshot, diagram&#10;&#10;Description automatically generated">
             <a:extLst>
               <a:ext uri="{FF2B5EF4-FFF2-40B4-BE49-F238E27FC236}">
-                <a16:creationId xmlns:a16="http://schemas.microsoft.com/office/drawing/2014/main" id="{1308D0C7-1A45-BA0F-910E-1B76483ABB3D}"/>
+                <a16:creationId xmlns:a16="http://schemas.microsoft.com/office/drawing/2014/main" id="{DAFD60B2-9A35-93C8-F5CF-CDE92BB55460}"/>
               </a:ext>
             </a:extLst>
           </p:cNvPr>
-          <p:cNvSpPr txBox="1"/>
+          <p:cNvPicPr>
+            <a:picLocks noChangeAspect="1"/>
+          </p:cNvPicPr>
           <p:nvPr/>
-        </p:nvSpPr>
+        </p:nvPicPr>
+        <p:blipFill rotWithShape="1">
+          <a:blip r:embed="rId2">
+            <a:extLst>
+              <a:ext uri="{28A0092B-C50C-407E-A947-70E740481C1C}">
+                <a14:useLocalDpi xmlns:a14="http://schemas.microsoft.com/office/drawing/2010/main" val="0"/>
+              </a:ext>
+            </a:extLst>
+          </a:blip>
+          <a:srcRect l="872" t="1432" b="4506"/>
+          <a:stretch/>
+        </p:blipFill>
         <p:spPr>
           <a:xfrm>
-            <a:off x="1786466" y="575733"/>
-            <a:ext cx="8619067" cy="369332"/>
+            <a:off x="765822" y="0"/>
+            <a:ext cx="10660356" cy="2697480"/>
           </a:xfrm>
           <a:prstGeom prst="rect">
             <a:avLst/>
           </a:prstGeom>
-          <a:noFill/>
         </p:spPr>
-        <p:txBody>
-          <a:bodyPr wrap="square" rtlCol="0">
-            <a:spAutoFit/>
-          </a:bodyPr>
-          <a:lstStyle/>
-          <a:p>
-            <a:pPr algn="ctr"/>
-            <a:r>
-              <a:rPr lang="en-SG" dirty="0"/>
-              <a:t>All experiments we have touch tip for aspiration, no touch tip for dispense</a:t>
-            </a:r>
-          </a:p>
-        </p:txBody>
-      </p:sp>
+      </p:pic>
     </p:spTree>
     <p:extLst>
       <p:ext uri="{BB962C8B-B14F-4D97-AF65-F5344CB8AC3E}">

</xml_diff>